<commit_message>
tweaks n what not
</commit_message>
<xml_diff>
--- a/Power Automate Image Analytics/Power Automate Image Analytics.pptx
+++ b/Power Automate Image Analytics/Power Automate Image Analytics.pptx
@@ -7696,14 +7696,21 @@
           <a:p>
             <a:r>
               <a:rPr lang="en-IE" dirty="0"/>
-              <a:t>Power Automate</a:t>
+              <a:t>Power Automate </a:t>
             </a:r>
             <a:br>
               <a:rPr lang="en-IE" dirty="0"/>
             </a:br>
             <a:r>
               <a:rPr lang="en-IE" dirty="0"/>
-              <a:t>Image Analytics</a:t>
+              <a:t>your way to </a:t>
+            </a:r>
+            <a:br>
+              <a:rPr lang="en-IE" dirty="0"/>
+            </a:br>
+            <a:r>
+              <a:rPr lang="en-IE" dirty="0"/>
+              <a:t>Cognitive Services</a:t>
             </a:r>
           </a:p>
         </p:txBody>
@@ -12176,21 +12183,6 @@
 </file>
 
 <file path=customXml/item1.xml><?xml version="1.0" encoding="utf-8"?>
-<?mso-contentType ?>
-<FormTemplates xmlns="http://schemas.microsoft.com/sharepoint/v3/contenttype/forms">
-  <Display>DocumentLibraryForm</Display>
-  <Edit>DocumentLibraryForm</Edit>
-  <New>DocumentLibraryForm</New>
-</FormTemplates>
-</file>
-
-<file path=customXml/item2.xml><?xml version="1.0" encoding="utf-8"?>
-<p:properties xmlns:p="http://schemas.microsoft.com/office/2006/metadata/properties" xmlns:xsi="http://www.w3.org/2001/XMLSchema-instance" xmlns:pc="http://schemas.microsoft.com/office/infopath/2007/PartnerControls">
-  <documentManagement/>
-</p:properties>
-</file>
-
-<file path=customXml/item3.xml><?xml version="1.0" encoding="utf-8"?>
 <ct:contentTypeSchema xmlns:ct="http://schemas.microsoft.com/office/2006/metadata/contentType" xmlns:ma="http://schemas.microsoft.com/office/2006/metadata/properties/metaAttributes" ct:_="" ma:_="" ma:contentTypeName="Document" ma:contentTypeID="0x010100C06DE69A4F4BF842879CBB58309FEB35" ma:contentTypeVersion="10" ma:contentTypeDescription="Create a new document." ma:contentTypeScope="" ma:versionID="2186611467dfd53204e79c9641488a9c">
   <xsd:schema xmlns:xsd="http://www.w3.org/2001/XMLSchema" xmlns:xs="http://www.w3.org/2001/XMLSchema" xmlns:p="http://schemas.microsoft.com/office/2006/metadata/properties" xmlns:ns2="12d2731f-cf8f-4a67-b1ff-7d98a1aee283" xmlns:ns3="c353b6c8-18ed-4b56-a5c5-6495e55a9c15" targetNamespace="http://schemas.microsoft.com/office/2006/metadata/properties" ma:root="true" ma:fieldsID="d8b4bb9d5ba4a874382a27d5d1ce83b4" ns2:_="" ns3:_="">
     <xsd:import namespace="12d2731f-cf8f-4a67-b1ff-7d98a1aee283"/>
@@ -12393,10 +12385,36 @@
 </ct:contentTypeSchema>
 </file>
 
+<file path=customXml/item2.xml><?xml version="1.0" encoding="utf-8"?>
+<p:properties xmlns:p="http://schemas.microsoft.com/office/2006/metadata/properties" xmlns:xsi="http://www.w3.org/2001/XMLSchema-instance" xmlns:pc="http://schemas.microsoft.com/office/infopath/2007/PartnerControls">
+  <documentManagement/>
+</p:properties>
+</file>
+
+<file path=customXml/item3.xml><?xml version="1.0" encoding="utf-8"?>
+<?mso-contentType ?>
+<FormTemplates xmlns="http://schemas.microsoft.com/sharepoint/v3/contenttype/forms">
+  <Display>DocumentLibraryForm</Display>
+  <Edit>DocumentLibraryForm</Edit>
+  <New>DocumentLibraryForm</New>
+</FormTemplates>
+</file>
+
 <file path=customXml/itemProps1.xml><?xml version="1.0" encoding="utf-8"?>
-<ds:datastoreItem xmlns:ds="http://schemas.openxmlformats.org/officeDocument/2006/customXml" ds:itemID="{10C75660-6496-4BAB-8878-FA53D17BE5D9}">
+<ds:datastoreItem xmlns:ds="http://schemas.openxmlformats.org/officeDocument/2006/customXml" ds:itemID="{A531BB72-B9A7-4BD7-BFB1-AC10A5517624}">
   <ds:schemaRefs>
-    <ds:schemaRef ds:uri="http://schemas.microsoft.com/sharepoint/v3/contenttype/forms"/>
+    <ds:schemaRef ds:uri="http://schemas.microsoft.com/office/2006/metadata/contentType"/>
+    <ds:schemaRef ds:uri="http://schemas.microsoft.com/office/2006/metadata/properties/metaAttributes"/>
+    <ds:schemaRef ds:uri="http://www.w3.org/2001/XMLSchema"/>
+    <ds:schemaRef ds:uri="http://schemas.microsoft.com/office/2006/metadata/properties"/>
+    <ds:schemaRef ds:uri="12d2731f-cf8f-4a67-b1ff-7d98a1aee283"/>
+    <ds:schemaRef ds:uri="c353b6c8-18ed-4b56-a5c5-6495e55a9c15"/>
+    <ds:schemaRef ds:uri="http://schemas.microsoft.com/office/2006/documentManagement/types"/>
+    <ds:schemaRef ds:uri="http://schemas.microsoft.com/office/infopath/2007/PartnerControls"/>
+    <ds:schemaRef ds:uri="http://schemas.openxmlformats.org/package/2006/metadata/core-properties"/>
+    <ds:schemaRef ds:uri="http://purl.org/dc/elements/1.1/"/>
+    <ds:schemaRef ds:uri="http://purl.org/dc/terms/"/>
+    <ds:schemaRef ds:uri="http://schemas.microsoft.com/internal/obd"/>
   </ds:schemaRefs>
 </ds:datastoreItem>
 </file>
@@ -12419,20 +12437,9 @@
 </file>
 
 <file path=customXml/itemProps3.xml><?xml version="1.0" encoding="utf-8"?>
-<ds:datastoreItem xmlns:ds="http://schemas.openxmlformats.org/officeDocument/2006/customXml" ds:itemID="{A531BB72-B9A7-4BD7-BFB1-AC10A5517624}">
+<ds:datastoreItem xmlns:ds="http://schemas.openxmlformats.org/officeDocument/2006/customXml" ds:itemID="{10C75660-6496-4BAB-8878-FA53D17BE5D9}">
   <ds:schemaRefs>
-    <ds:schemaRef ds:uri="http://schemas.microsoft.com/office/2006/metadata/contentType"/>
-    <ds:schemaRef ds:uri="http://schemas.microsoft.com/office/2006/metadata/properties/metaAttributes"/>
-    <ds:schemaRef ds:uri="http://www.w3.org/2001/XMLSchema"/>
-    <ds:schemaRef ds:uri="http://schemas.microsoft.com/office/2006/metadata/properties"/>
-    <ds:schemaRef ds:uri="12d2731f-cf8f-4a67-b1ff-7d98a1aee283"/>
-    <ds:schemaRef ds:uri="c353b6c8-18ed-4b56-a5c5-6495e55a9c15"/>
-    <ds:schemaRef ds:uri="http://schemas.microsoft.com/office/2006/documentManagement/types"/>
-    <ds:schemaRef ds:uri="http://schemas.microsoft.com/office/infopath/2007/PartnerControls"/>
-    <ds:schemaRef ds:uri="http://schemas.openxmlformats.org/package/2006/metadata/core-properties"/>
-    <ds:schemaRef ds:uri="http://purl.org/dc/elements/1.1/"/>
-    <ds:schemaRef ds:uri="http://purl.org/dc/terms/"/>
-    <ds:schemaRef ds:uri="http://schemas.microsoft.com/internal/obd"/>
+    <ds:schemaRef ds:uri="http://schemas.microsoft.com/sharepoint/v3/contenttype/forms"/>
   </ds:schemaRefs>
 </ds:datastoreItem>
 </file>
</xml_diff>

<commit_message>
changed for us election
</commit_message>
<xml_diff>
--- a/Power Automate Image Analytics/Power Automate Image Analytics.pptx
+++ b/Power Automate Image Analytics/Power Automate Image Analytics.pptx
@@ -208,7 +208,7 @@
           <a:p>
             <a:fld id="{34B5C9CA-2D5F-447E-9B79-C98CB45DDD68}" type="datetimeFigureOut">
               <a:rPr lang="en-US" smtClean="0"/>
-              <a:t>11/5/2020</a:t>
+              <a:t>11/6/2020</a:t>
             </a:fld>
             <a:endParaRPr lang="en-US"/>
           </a:p>
@@ -373,7 +373,7 @@
           <a:p>
             <a:fld id="{9FBB69ED-36D7-4532-B7E1-AEDC9E37F886}" type="datetimeFigureOut">
               <a:rPr lang="en-US" smtClean="0"/>
-              <a:t>11/5/2020</a:t>
+              <a:t>11/6/2020</a:t>
             </a:fld>
             <a:endParaRPr lang="en-US"/>
           </a:p>
@@ -7983,7 +7983,7 @@
         <p:spPr>
           <a:xfrm>
             <a:off x="5798009" y="3059372"/>
-            <a:ext cx="5141537" cy="1569660"/>
+            <a:ext cx="5141537" cy="1938992"/>
           </a:xfrm>
           <a:prstGeom prst="rect">
             <a:avLst/>
@@ -8057,6 +8057,22 @@
                 <a:cs typeface="Segoe UI" panose="020B0502040204020203" pitchFamily="34" charset="0"/>
               </a:rPr>
               <a:t>New Pics or from your Gallery</a:t>
+            </a:r>
+          </a:p>
+          <a:p>
+            <a:pPr marL="285750" indent="-285750">
+              <a:buFont typeface="Wingdings" panose="05000000000000000000" pitchFamily="2" charset="2"/>
+              <a:buChar char="ü"/>
+            </a:pPr>
+            <a:r>
+              <a:rPr lang="en-IE" sz="2400" dirty="0">
+                <a:solidFill>
+                  <a:schemeClr val="accent6"/>
+                </a:solidFill>
+                <a:latin typeface="Segoe UI" panose="020B0502040204020203" pitchFamily="34" charset="0"/>
+                <a:cs typeface="Segoe UI" panose="020B0502040204020203" pitchFamily="34" charset="0"/>
+              </a:rPr>
+              <a:t>No USA Election!!</a:t>
             </a:r>
           </a:p>
         </p:txBody>
@@ -12183,6 +12199,21 @@
 </file>
 
 <file path=customXml/item1.xml><?xml version="1.0" encoding="utf-8"?>
+<?mso-contentType ?>
+<FormTemplates xmlns="http://schemas.microsoft.com/sharepoint/v3/contenttype/forms">
+  <Display>DocumentLibraryForm</Display>
+  <Edit>DocumentLibraryForm</Edit>
+  <New>DocumentLibraryForm</New>
+</FormTemplates>
+</file>
+
+<file path=customXml/item2.xml><?xml version="1.0" encoding="utf-8"?>
+<p:properties xmlns:p="http://schemas.microsoft.com/office/2006/metadata/properties" xmlns:xsi="http://www.w3.org/2001/XMLSchema-instance" xmlns:pc="http://schemas.microsoft.com/office/infopath/2007/PartnerControls">
+  <documentManagement/>
+</p:properties>
+</file>
+
+<file path=customXml/item3.xml><?xml version="1.0" encoding="utf-8"?>
 <ct:contentTypeSchema xmlns:ct="http://schemas.microsoft.com/office/2006/metadata/contentType" xmlns:ma="http://schemas.microsoft.com/office/2006/metadata/properties/metaAttributes" ct:_="" ma:_="" ma:contentTypeName="Document" ma:contentTypeID="0x010100C06DE69A4F4BF842879CBB58309FEB35" ma:contentTypeVersion="10" ma:contentTypeDescription="Create a new document." ma:contentTypeScope="" ma:versionID="2186611467dfd53204e79c9641488a9c">
   <xsd:schema xmlns:xsd="http://www.w3.org/2001/XMLSchema" xmlns:xs="http://www.w3.org/2001/XMLSchema" xmlns:p="http://schemas.microsoft.com/office/2006/metadata/properties" xmlns:ns2="12d2731f-cf8f-4a67-b1ff-7d98a1aee283" xmlns:ns3="c353b6c8-18ed-4b56-a5c5-6495e55a9c15" targetNamespace="http://schemas.microsoft.com/office/2006/metadata/properties" ma:root="true" ma:fieldsID="d8b4bb9d5ba4a874382a27d5d1ce83b4" ns2:_="" ns3:_="">
     <xsd:import namespace="12d2731f-cf8f-4a67-b1ff-7d98a1aee283"/>
@@ -12385,36 +12416,10 @@
 </ct:contentTypeSchema>
 </file>
 
-<file path=customXml/item2.xml><?xml version="1.0" encoding="utf-8"?>
-<p:properties xmlns:p="http://schemas.microsoft.com/office/2006/metadata/properties" xmlns:xsi="http://www.w3.org/2001/XMLSchema-instance" xmlns:pc="http://schemas.microsoft.com/office/infopath/2007/PartnerControls">
-  <documentManagement/>
-</p:properties>
-</file>
-
-<file path=customXml/item3.xml><?xml version="1.0" encoding="utf-8"?>
-<?mso-contentType ?>
-<FormTemplates xmlns="http://schemas.microsoft.com/sharepoint/v3/contenttype/forms">
-  <Display>DocumentLibraryForm</Display>
-  <Edit>DocumentLibraryForm</Edit>
-  <New>DocumentLibraryForm</New>
-</FormTemplates>
-</file>
-
 <file path=customXml/itemProps1.xml><?xml version="1.0" encoding="utf-8"?>
-<ds:datastoreItem xmlns:ds="http://schemas.openxmlformats.org/officeDocument/2006/customXml" ds:itemID="{A531BB72-B9A7-4BD7-BFB1-AC10A5517624}">
+<ds:datastoreItem xmlns:ds="http://schemas.openxmlformats.org/officeDocument/2006/customXml" ds:itemID="{10C75660-6496-4BAB-8878-FA53D17BE5D9}">
   <ds:schemaRefs>
-    <ds:schemaRef ds:uri="http://schemas.microsoft.com/office/2006/metadata/contentType"/>
-    <ds:schemaRef ds:uri="http://schemas.microsoft.com/office/2006/metadata/properties/metaAttributes"/>
-    <ds:schemaRef ds:uri="http://www.w3.org/2001/XMLSchema"/>
-    <ds:schemaRef ds:uri="http://schemas.microsoft.com/office/2006/metadata/properties"/>
-    <ds:schemaRef ds:uri="12d2731f-cf8f-4a67-b1ff-7d98a1aee283"/>
-    <ds:schemaRef ds:uri="c353b6c8-18ed-4b56-a5c5-6495e55a9c15"/>
-    <ds:schemaRef ds:uri="http://schemas.microsoft.com/office/2006/documentManagement/types"/>
-    <ds:schemaRef ds:uri="http://schemas.microsoft.com/office/infopath/2007/PartnerControls"/>
-    <ds:schemaRef ds:uri="http://schemas.openxmlformats.org/package/2006/metadata/core-properties"/>
-    <ds:schemaRef ds:uri="http://purl.org/dc/elements/1.1/"/>
-    <ds:schemaRef ds:uri="http://purl.org/dc/terms/"/>
-    <ds:schemaRef ds:uri="http://schemas.microsoft.com/internal/obd"/>
+    <ds:schemaRef ds:uri="http://schemas.microsoft.com/sharepoint/v3/contenttype/forms"/>
   </ds:schemaRefs>
 </ds:datastoreItem>
 </file>
@@ -12437,9 +12442,20 @@
 </file>
 
 <file path=customXml/itemProps3.xml><?xml version="1.0" encoding="utf-8"?>
-<ds:datastoreItem xmlns:ds="http://schemas.openxmlformats.org/officeDocument/2006/customXml" ds:itemID="{10C75660-6496-4BAB-8878-FA53D17BE5D9}">
+<ds:datastoreItem xmlns:ds="http://schemas.openxmlformats.org/officeDocument/2006/customXml" ds:itemID="{A531BB72-B9A7-4BD7-BFB1-AC10A5517624}">
   <ds:schemaRefs>
-    <ds:schemaRef ds:uri="http://schemas.microsoft.com/sharepoint/v3/contenttype/forms"/>
+    <ds:schemaRef ds:uri="http://schemas.microsoft.com/office/2006/metadata/contentType"/>
+    <ds:schemaRef ds:uri="http://schemas.microsoft.com/office/2006/metadata/properties/metaAttributes"/>
+    <ds:schemaRef ds:uri="http://www.w3.org/2001/XMLSchema"/>
+    <ds:schemaRef ds:uri="http://schemas.microsoft.com/office/2006/metadata/properties"/>
+    <ds:schemaRef ds:uri="12d2731f-cf8f-4a67-b1ff-7d98a1aee283"/>
+    <ds:schemaRef ds:uri="c353b6c8-18ed-4b56-a5c5-6495e55a9c15"/>
+    <ds:schemaRef ds:uri="http://schemas.microsoft.com/office/2006/documentManagement/types"/>
+    <ds:schemaRef ds:uri="http://schemas.microsoft.com/office/infopath/2007/PartnerControls"/>
+    <ds:schemaRef ds:uri="http://schemas.openxmlformats.org/package/2006/metadata/core-properties"/>
+    <ds:schemaRef ds:uri="http://purl.org/dc/elements/1.1/"/>
+    <ds:schemaRef ds:uri="http://purl.org/dc/terms/"/>
+    <ds:schemaRef ds:uri="http://schemas.microsoft.com/internal/obd"/>
   </ds:schemaRefs>
 </ds:datastoreItem>
 </file>
</xml_diff>

<commit_message>
remove depricated AZ Storage module
</commit_message>
<xml_diff>
--- a/Power Automate Image Analytics/Power Automate Image Analytics.pptx
+++ b/Power Automate Image Analytics/Power Automate Image Analytics.pptx
@@ -208,7 +208,7 @@
           <a:p>
             <a:fld id="{34B5C9CA-2D5F-447E-9B79-C98CB45DDD68}" type="datetimeFigureOut">
               <a:rPr lang="en-US" smtClean="0"/>
-              <a:t>11/6/2020</a:t>
+              <a:t>2/6/2021</a:t>
             </a:fld>
             <a:endParaRPr lang="en-US"/>
           </a:p>
@@ -373,7 +373,7 @@
           <a:p>
             <a:fld id="{9FBB69ED-36D7-4532-B7E1-AEDC9E37F886}" type="datetimeFigureOut">
               <a:rPr lang="en-US" smtClean="0"/>
-              <a:t>11/6/2020</a:t>
+              <a:t>2/6/2021</a:t>
             </a:fld>
             <a:endParaRPr lang="en-US"/>
           </a:p>
@@ -8072,7 +8072,28 @@
                 <a:latin typeface="Segoe UI" panose="020B0502040204020203" pitchFamily="34" charset="0"/>
                 <a:cs typeface="Segoe UI" panose="020B0502040204020203" pitchFamily="34" charset="0"/>
               </a:rPr>
-              <a:t>No USA Election!!</a:t>
+              <a:t>No Politics Please </a:t>
+            </a:r>
+            <a:r>
+              <a:rPr lang="en-IE" sz="2400" dirty="0">
+                <a:solidFill>
+                  <a:schemeClr val="accent6"/>
+                </a:solidFill>
+                <a:latin typeface="Segoe UI" panose="020B0502040204020203" pitchFamily="34" charset="0"/>
+                <a:cs typeface="Segoe UI" panose="020B0502040204020203" pitchFamily="34" charset="0"/>
+                <a:sym typeface="Wingdings" panose="05000000000000000000" pitchFamily="2" charset="2"/>
+              </a:rPr>
+              <a:t> </a:t>
+            </a:r>
+            <a:r>
+              <a:rPr lang="en-IE" sz="2400" dirty="0">
+                <a:solidFill>
+                  <a:schemeClr val="accent6"/>
+                </a:solidFill>
+                <a:latin typeface="Segoe UI" panose="020B0502040204020203" pitchFamily="34" charset="0"/>
+                <a:cs typeface="Segoe UI" panose="020B0502040204020203" pitchFamily="34" charset="0"/>
+              </a:rPr>
+              <a:t>!!</a:t>
             </a:r>
           </a:p>
         </p:txBody>
@@ -12199,21 +12220,6 @@
 </file>
 
 <file path=customXml/item1.xml><?xml version="1.0" encoding="utf-8"?>
-<?mso-contentType ?>
-<FormTemplates xmlns="http://schemas.microsoft.com/sharepoint/v3/contenttype/forms">
-  <Display>DocumentLibraryForm</Display>
-  <Edit>DocumentLibraryForm</Edit>
-  <New>DocumentLibraryForm</New>
-</FormTemplates>
-</file>
-
-<file path=customXml/item2.xml><?xml version="1.0" encoding="utf-8"?>
-<p:properties xmlns:p="http://schemas.microsoft.com/office/2006/metadata/properties" xmlns:xsi="http://www.w3.org/2001/XMLSchema-instance" xmlns:pc="http://schemas.microsoft.com/office/infopath/2007/PartnerControls">
-  <documentManagement/>
-</p:properties>
-</file>
-
-<file path=customXml/item3.xml><?xml version="1.0" encoding="utf-8"?>
 <ct:contentTypeSchema xmlns:ct="http://schemas.microsoft.com/office/2006/metadata/contentType" xmlns:ma="http://schemas.microsoft.com/office/2006/metadata/properties/metaAttributes" ct:_="" ma:_="" ma:contentTypeName="Document" ma:contentTypeID="0x010100C06DE69A4F4BF842879CBB58309FEB35" ma:contentTypeVersion="10" ma:contentTypeDescription="Create a new document." ma:contentTypeScope="" ma:versionID="2186611467dfd53204e79c9641488a9c">
   <xsd:schema xmlns:xsd="http://www.w3.org/2001/XMLSchema" xmlns:xs="http://www.w3.org/2001/XMLSchema" xmlns:p="http://schemas.microsoft.com/office/2006/metadata/properties" xmlns:ns2="12d2731f-cf8f-4a67-b1ff-7d98a1aee283" xmlns:ns3="c353b6c8-18ed-4b56-a5c5-6495e55a9c15" targetNamespace="http://schemas.microsoft.com/office/2006/metadata/properties" ma:root="true" ma:fieldsID="d8b4bb9d5ba4a874382a27d5d1ce83b4" ns2:_="" ns3:_="">
     <xsd:import namespace="12d2731f-cf8f-4a67-b1ff-7d98a1aee283"/>
@@ -12416,10 +12422,36 @@
 </ct:contentTypeSchema>
 </file>
 
+<file path=customXml/item2.xml><?xml version="1.0" encoding="utf-8"?>
+<p:properties xmlns:p="http://schemas.microsoft.com/office/2006/metadata/properties" xmlns:xsi="http://www.w3.org/2001/XMLSchema-instance" xmlns:pc="http://schemas.microsoft.com/office/infopath/2007/PartnerControls">
+  <documentManagement/>
+</p:properties>
+</file>
+
+<file path=customXml/item3.xml><?xml version="1.0" encoding="utf-8"?>
+<?mso-contentType ?>
+<FormTemplates xmlns="http://schemas.microsoft.com/sharepoint/v3/contenttype/forms">
+  <Display>DocumentLibraryForm</Display>
+  <Edit>DocumentLibraryForm</Edit>
+  <New>DocumentLibraryForm</New>
+</FormTemplates>
+</file>
+
 <file path=customXml/itemProps1.xml><?xml version="1.0" encoding="utf-8"?>
-<ds:datastoreItem xmlns:ds="http://schemas.openxmlformats.org/officeDocument/2006/customXml" ds:itemID="{10C75660-6496-4BAB-8878-FA53D17BE5D9}">
+<ds:datastoreItem xmlns:ds="http://schemas.openxmlformats.org/officeDocument/2006/customXml" ds:itemID="{A531BB72-B9A7-4BD7-BFB1-AC10A5517624}">
   <ds:schemaRefs>
-    <ds:schemaRef ds:uri="http://schemas.microsoft.com/sharepoint/v3/contenttype/forms"/>
+    <ds:schemaRef ds:uri="http://schemas.microsoft.com/office/2006/metadata/contentType"/>
+    <ds:schemaRef ds:uri="http://schemas.microsoft.com/office/2006/metadata/properties/metaAttributes"/>
+    <ds:schemaRef ds:uri="http://www.w3.org/2001/XMLSchema"/>
+    <ds:schemaRef ds:uri="http://schemas.microsoft.com/office/2006/metadata/properties"/>
+    <ds:schemaRef ds:uri="12d2731f-cf8f-4a67-b1ff-7d98a1aee283"/>
+    <ds:schemaRef ds:uri="c353b6c8-18ed-4b56-a5c5-6495e55a9c15"/>
+    <ds:schemaRef ds:uri="http://schemas.microsoft.com/office/2006/documentManagement/types"/>
+    <ds:schemaRef ds:uri="http://schemas.microsoft.com/office/infopath/2007/PartnerControls"/>
+    <ds:schemaRef ds:uri="http://schemas.openxmlformats.org/package/2006/metadata/core-properties"/>
+    <ds:schemaRef ds:uri="http://purl.org/dc/elements/1.1/"/>
+    <ds:schemaRef ds:uri="http://purl.org/dc/terms/"/>
+    <ds:schemaRef ds:uri="http://schemas.microsoft.com/internal/obd"/>
   </ds:schemaRefs>
 </ds:datastoreItem>
 </file>
@@ -12442,20 +12474,9 @@
 </file>
 
 <file path=customXml/itemProps3.xml><?xml version="1.0" encoding="utf-8"?>
-<ds:datastoreItem xmlns:ds="http://schemas.openxmlformats.org/officeDocument/2006/customXml" ds:itemID="{A531BB72-B9A7-4BD7-BFB1-AC10A5517624}">
+<ds:datastoreItem xmlns:ds="http://schemas.openxmlformats.org/officeDocument/2006/customXml" ds:itemID="{10C75660-6496-4BAB-8878-FA53D17BE5D9}">
   <ds:schemaRefs>
-    <ds:schemaRef ds:uri="http://schemas.microsoft.com/office/2006/metadata/contentType"/>
-    <ds:schemaRef ds:uri="http://schemas.microsoft.com/office/2006/metadata/properties/metaAttributes"/>
-    <ds:schemaRef ds:uri="http://www.w3.org/2001/XMLSchema"/>
-    <ds:schemaRef ds:uri="http://schemas.microsoft.com/office/2006/metadata/properties"/>
-    <ds:schemaRef ds:uri="12d2731f-cf8f-4a67-b1ff-7d98a1aee283"/>
-    <ds:schemaRef ds:uri="c353b6c8-18ed-4b56-a5c5-6495e55a9c15"/>
-    <ds:schemaRef ds:uri="http://schemas.microsoft.com/office/2006/documentManagement/types"/>
-    <ds:schemaRef ds:uri="http://schemas.microsoft.com/office/infopath/2007/PartnerControls"/>
-    <ds:schemaRef ds:uri="http://schemas.openxmlformats.org/package/2006/metadata/core-properties"/>
-    <ds:schemaRef ds:uri="http://purl.org/dc/elements/1.1/"/>
-    <ds:schemaRef ds:uri="http://purl.org/dc/terms/"/>
-    <ds:schemaRef ds:uri="http://schemas.microsoft.com/internal/obd"/>
+    <ds:schemaRef ds:uri="http://schemas.microsoft.com/sharepoint/v3/contenttype/forms"/>
   </ds:schemaRefs>
 </ds:datastoreItem>
 </file>
</xml_diff>

<commit_message>
tweaks here & there
</commit_message>
<xml_diff>
--- a/Power Automate Image Analytics/Power Automate Image Analytics.pptx
+++ b/Power Automate Image Analytics/Power Automate Image Analytics.pptx
@@ -208,7 +208,7 @@
           <a:p>
             <a:fld id="{34B5C9CA-2D5F-447E-9B79-C98CB45DDD68}" type="datetimeFigureOut">
               <a:rPr lang="en-US" smtClean="0"/>
-              <a:t>2/6/2021</a:t>
+              <a:t>2/7/2021</a:t>
             </a:fld>
             <a:endParaRPr lang="en-US"/>
           </a:p>
@@ -373,7 +373,7 @@
           <a:p>
             <a:fld id="{9FBB69ED-36D7-4532-B7E1-AEDC9E37F886}" type="datetimeFigureOut">
               <a:rPr lang="en-US" smtClean="0"/>
-              <a:t>2/6/2021</a:t>
+              <a:t>2/7/2021</a:t>
             </a:fld>
             <a:endParaRPr lang="en-US"/>
           </a:p>
@@ -9079,7 +9079,7 @@
           <a:prstGeom prst="rect">
             <a:avLst/>
           </a:prstGeom>
-          <a:ln w="12700">
+          <a:ln w="9525">
             <a:solidFill>
               <a:schemeClr val="tx1">
                 <a:lumMod val="65000"/>
@@ -9583,7 +9583,7 @@
         </p:blipFill>
         <p:spPr>
           <a:xfrm>
-            <a:off x="9881608" y="2691619"/>
+            <a:off x="9966267" y="2427396"/>
             <a:ext cx="360000" cy="360000"/>
           </a:xfrm>
           <a:prstGeom prst="rect">
@@ -10203,7 +10203,7 @@
         </p:nvSpPr>
         <p:spPr>
           <a:xfrm>
-            <a:off x="10301058" y="2632411"/>
+            <a:off x="10385717" y="2368188"/>
             <a:ext cx="1526702" cy="461665"/>
           </a:xfrm>
           <a:prstGeom prst="rect">
@@ -11018,6 +11018,89 @@
           </a:prstGeom>
         </p:spPr>
       </p:pic>
+      <p:pic>
+        <p:nvPicPr>
+          <p:cNvPr id="8" name="Graphic 7" descr="Garbage outline">
+            <a:extLst>
+              <a:ext uri="{FF2B5EF4-FFF2-40B4-BE49-F238E27FC236}">
+                <a16:creationId xmlns:a16="http://schemas.microsoft.com/office/drawing/2014/main" id="{56840D06-9B57-4729-A128-68CF49A51CFF}"/>
+              </a:ext>
+            </a:extLst>
+          </p:cNvPr>
+          <p:cNvPicPr>
+            <a:picLocks noChangeAspect="1"/>
+          </p:cNvPicPr>
+          <p:nvPr/>
+        </p:nvPicPr>
+        <p:blipFill>
+          <a:blip r:embed="rId16" cstate="print">
+            <a:extLst>
+              <a:ext uri="{28A0092B-C50C-407E-A947-70E740481C1C}">
+                <a14:useLocalDpi xmlns:a14="http://schemas.microsoft.com/office/drawing/2010/main" val="0"/>
+              </a:ext>
+              <a:ext uri="{96DAC541-7B7A-43D3-8B79-37D633B846F1}">
+                <asvg:svgBlip xmlns:asvg="http://schemas.microsoft.com/office/drawing/2016/SVG/main" r:embed="rId17"/>
+              </a:ext>
+            </a:extLst>
+          </a:blip>
+          <a:stretch>
+            <a:fillRect/>
+          </a:stretch>
+        </p:blipFill>
+        <p:spPr>
+          <a:xfrm>
+            <a:off x="9980217" y="2853641"/>
+            <a:ext cx="360001" cy="360001"/>
+          </a:xfrm>
+          <a:prstGeom prst="rect">
+            <a:avLst/>
+          </a:prstGeom>
+        </p:spPr>
+      </p:pic>
+      <p:sp>
+        <p:nvSpPr>
+          <p:cNvPr id="60" name="TextBox 59">
+            <a:extLst>
+              <a:ext uri="{FF2B5EF4-FFF2-40B4-BE49-F238E27FC236}">
+                <a16:creationId xmlns:a16="http://schemas.microsoft.com/office/drawing/2014/main" id="{77874033-1E0D-4781-8DDC-B85B71B1D5A7}"/>
+              </a:ext>
+            </a:extLst>
+          </p:cNvPr>
+          <p:cNvSpPr txBox="1"/>
+          <p:nvPr/>
+        </p:nvSpPr>
+        <p:spPr>
+          <a:xfrm>
+            <a:off x="10385717" y="2883298"/>
+            <a:ext cx="1526702" cy="276999"/>
+          </a:xfrm>
+          <a:prstGeom prst="rect">
+            <a:avLst/>
+          </a:prstGeom>
+          <a:noFill/>
+        </p:spPr>
+        <p:txBody>
+          <a:bodyPr wrap="square" rtlCol="0">
+            <a:spAutoFit/>
+          </a:bodyPr>
+          <a:lstStyle/>
+          <a:p>
+            <a:r>
+              <a:rPr lang="en-IE" sz="1200" dirty="0">
+                <a:solidFill>
+                  <a:schemeClr val="tx1">
+                    <a:lumMod val="65000"/>
+                    <a:lumOff val="35000"/>
+                  </a:schemeClr>
+                </a:solidFill>
+                <a:latin typeface="Segoe UI" panose="020B0502040204020203" pitchFamily="34" charset="0"/>
+                <a:cs typeface="Segoe UI" panose="020B0502040204020203" pitchFamily="34" charset="0"/>
+              </a:rPr>
+              <a:t>Delete Email</a:t>
+            </a:r>
+          </a:p>
+        </p:txBody>
+      </p:sp>
     </p:spTree>
     <p:extLst>
       <p:ext uri="{BB962C8B-B14F-4D97-AF65-F5344CB8AC3E}">
@@ -12220,6 +12303,21 @@
 </file>
 
 <file path=customXml/item1.xml><?xml version="1.0" encoding="utf-8"?>
+<?mso-contentType ?>
+<FormTemplates xmlns="http://schemas.microsoft.com/sharepoint/v3/contenttype/forms">
+  <Display>DocumentLibraryForm</Display>
+  <Edit>DocumentLibraryForm</Edit>
+  <New>DocumentLibraryForm</New>
+</FormTemplates>
+</file>
+
+<file path=customXml/item2.xml><?xml version="1.0" encoding="utf-8"?>
+<p:properties xmlns:p="http://schemas.microsoft.com/office/2006/metadata/properties" xmlns:xsi="http://www.w3.org/2001/XMLSchema-instance" xmlns:pc="http://schemas.microsoft.com/office/infopath/2007/PartnerControls">
+  <documentManagement/>
+</p:properties>
+</file>
+
+<file path=customXml/item3.xml><?xml version="1.0" encoding="utf-8"?>
 <ct:contentTypeSchema xmlns:ct="http://schemas.microsoft.com/office/2006/metadata/contentType" xmlns:ma="http://schemas.microsoft.com/office/2006/metadata/properties/metaAttributes" ct:_="" ma:_="" ma:contentTypeName="Document" ma:contentTypeID="0x010100C06DE69A4F4BF842879CBB58309FEB35" ma:contentTypeVersion="10" ma:contentTypeDescription="Create a new document." ma:contentTypeScope="" ma:versionID="2186611467dfd53204e79c9641488a9c">
   <xsd:schema xmlns:xsd="http://www.w3.org/2001/XMLSchema" xmlns:xs="http://www.w3.org/2001/XMLSchema" xmlns:p="http://schemas.microsoft.com/office/2006/metadata/properties" xmlns:ns2="12d2731f-cf8f-4a67-b1ff-7d98a1aee283" xmlns:ns3="c353b6c8-18ed-4b56-a5c5-6495e55a9c15" targetNamespace="http://schemas.microsoft.com/office/2006/metadata/properties" ma:root="true" ma:fieldsID="d8b4bb9d5ba4a874382a27d5d1ce83b4" ns2:_="" ns3:_="">
     <xsd:import namespace="12d2731f-cf8f-4a67-b1ff-7d98a1aee283"/>
@@ -12422,36 +12520,10 @@
 </ct:contentTypeSchema>
 </file>
 
-<file path=customXml/item2.xml><?xml version="1.0" encoding="utf-8"?>
-<p:properties xmlns:p="http://schemas.microsoft.com/office/2006/metadata/properties" xmlns:xsi="http://www.w3.org/2001/XMLSchema-instance" xmlns:pc="http://schemas.microsoft.com/office/infopath/2007/PartnerControls">
-  <documentManagement/>
-</p:properties>
-</file>
-
-<file path=customXml/item3.xml><?xml version="1.0" encoding="utf-8"?>
-<?mso-contentType ?>
-<FormTemplates xmlns="http://schemas.microsoft.com/sharepoint/v3/contenttype/forms">
-  <Display>DocumentLibraryForm</Display>
-  <Edit>DocumentLibraryForm</Edit>
-  <New>DocumentLibraryForm</New>
-</FormTemplates>
-</file>
-
 <file path=customXml/itemProps1.xml><?xml version="1.0" encoding="utf-8"?>
-<ds:datastoreItem xmlns:ds="http://schemas.openxmlformats.org/officeDocument/2006/customXml" ds:itemID="{A531BB72-B9A7-4BD7-BFB1-AC10A5517624}">
+<ds:datastoreItem xmlns:ds="http://schemas.openxmlformats.org/officeDocument/2006/customXml" ds:itemID="{10C75660-6496-4BAB-8878-FA53D17BE5D9}">
   <ds:schemaRefs>
-    <ds:schemaRef ds:uri="http://schemas.microsoft.com/office/2006/metadata/contentType"/>
-    <ds:schemaRef ds:uri="http://schemas.microsoft.com/office/2006/metadata/properties/metaAttributes"/>
-    <ds:schemaRef ds:uri="http://www.w3.org/2001/XMLSchema"/>
-    <ds:schemaRef ds:uri="http://schemas.microsoft.com/office/2006/metadata/properties"/>
-    <ds:schemaRef ds:uri="12d2731f-cf8f-4a67-b1ff-7d98a1aee283"/>
-    <ds:schemaRef ds:uri="c353b6c8-18ed-4b56-a5c5-6495e55a9c15"/>
-    <ds:schemaRef ds:uri="http://schemas.microsoft.com/office/2006/documentManagement/types"/>
-    <ds:schemaRef ds:uri="http://schemas.microsoft.com/office/infopath/2007/PartnerControls"/>
-    <ds:schemaRef ds:uri="http://schemas.openxmlformats.org/package/2006/metadata/core-properties"/>
-    <ds:schemaRef ds:uri="http://purl.org/dc/elements/1.1/"/>
-    <ds:schemaRef ds:uri="http://purl.org/dc/terms/"/>
-    <ds:schemaRef ds:uri="http://schemas.microsoft.com/internal/obd"/>
+    <ds:schemaRef ds:uri="http://schemas.microsoft.com/sharepoint/v3/contenttype/forms"/>
   </ds:schemaRefs>
 </ds:datastoreItem>
 </file>
@@ -12474,9 +12546,20 @@
 </file>
 
 <file path=customXml/itemProps3.xml><?xml version="1.0" encoding="utf-8"?>
-<ds:datastoreItem xmlns:ds="http://schemas.openxmlformats.org/officeDocument/2006/customXml" ds:itemID="{10C75660-6496-4BAB-8878-FA53D17BE5D9}">
+<ds:datastoreItem xmlns:ds="http://schemas.openxmlformats.org/officeDocument/2006/customXml" ds:itemID="{A531BB72-B9A7-4BD7-BFB1-AC10A5517624}">
   <ds:schemaRefs>
-    <ds:schemaRef ds:uri="http://schemas.microsoft.com/sharepoint/v3/contenttype/forms"/>
+    <ds:schemaRef ds:uri="http://schemas.microsoft.com/office/2006/metadata/contentType"/>
+    <ds:schemaRef ds:uri="http://schemas.microsoft.com/office/2006/metadata/properties/metaAttributes"/>
+    <ds:schemaRef ds:uri="http://www.w3.org/2001/XMLSchema"/>
+    <ds:schemaRef ds:uri="http://schemas.microsoft.com/office/2006/metadata/properties"/>
+    <ds:schemaRef ds:uri="12d2731f-cf8f-4a67-b1ff-7d98a1aee283"/>
+    <ds:schemaRef ds:uri="c353b6c8-18ed-4b56-a5c5-6495e55a9c15"/>
+    <ds:schemaRef ds:uri="http://schemas.microsoft.com/office/2006/documentManagement/types"/>
+    <ds:schemaRef ds:uri="http://schemas.microsoft.com/office/infopath/2007/PartnerControls"/>
+    <ds:schemaRef ds:uri="http://schemas.openxmlformats.org/package/2006/metadata/core-properties"/>
+    <ds:schemaRef ds:uri="http://purl.org/dc/elements/1.1/"/>
+    <ds:schemaRef ds:uri="http://purl.org/dc/terms/"/>
+    <ds:schemaRef ds:uri="http://schemas.microsoft.com/internal/obd"/>
   </ds:schemaRefs>
 </ds:datastoreItem>
 </file>
</xml_diff>

<commit_message>
added smart metric guide
</commit_message>
<xml_diff>
--- a/Power Automate Image Analytics/Power Automate Image Analytics.pptx
+++ b/Power Automate Image Analytics/Power Automate Image Analytics.pptx
@@ -208,7 +208,7 @@
           <a:p>
             <a:fld id="{34B5C9CA-2D5F-447E-9B79-C98CB45DDD68}" type="datetimeFigureOut">
               <a:rPr lang="en-US" smtClean="0"/>
-              <a:t>3/9/2021</a:t>
+              <a:t>3/12/2021</a:t>
             </a:fld>
             <a:endParaRPr lang="en-US"/>
           </a:p>
@@ -373,7 +373,7 @@
           <a:p>
             <a:fld id="{9FBB69ED-36D7-4532-B7E1-AEDC9E37F886}" type="datetimeFigureOut">
               <a:rPr lang="en-US" smtClean="0"/>
-              <a:t>3/9/2021</a:t>
+              <a:t>3/12/2021</a:t>
             </a:fld>
             <a:endParaRPr lang="en-US"/>
           </a:p>
@@ -9164,7 +9164,7 @@
         <p:spPr>
           <a:xfrm>
             <a:off x="3218136" y="1742593"/>
-            <a:ext cx="360000" cy="340000"/>
+            <a:ext cx="343058" cy="324000"/>
           </a:xfrm>
           <a:prstGeom prst="rect">
             <a:avLst/>
@@ -9173,10 +9173,10 @@
       </p:pic>
       <p:pic>
         <p:nvPicPr>
-          <p:cNvPr id="18" name="Picture 17">
+          <p:cNvPr id="21" name="Picture 20">
             <a:extLst>
               <a:ext uri="{FF2B5EF4-FFF2-40B4-BE49-F238E27FC236}">
-                <a16:creationId xmlns:a16="http://schemas.microsoft.com/office/drawing/2014/main" id="{991989E2-DBC6-48D9-99F3-CC7234CCF8CA}"/>
+                <a16:creationId xmlns:a16="http://schemas.microsoft.com/office/drawing/2014/main" id="{1811E613-8530-420F-AC86-24046088E5C5}"/>
               </a:ext>
             </a:extLst>
           </p:cNvPr>
@@ -9193,8 +9193,8 @@
         </p:blipFill>
         <p:spPr>
           <a:xfrm>
-            <a:off x="3217360" y="2825332"/>
-            <a:ext cx="360000" cy="360000"/>
+            <a:off x="8479542" y="2459343"/>
+            <a:ext cx="187500" cy="180000"/>
           </a:xfrm>
           <a:prstGeom prst="rect">
             <a:avLst/>
@@ -9203,40 +9203,10 @@
       </p:pic>
       <p:pic>
         <p:nvPicPr>
-          <p:cNvPr id="19" name="Picture 18">
+          <p:cNvPr id="22" name="Picture 21">
             <a:extLst>
               <a:ext uri="{FF2B5EF4-FFF2-40B4-BE49-F238E27FC236}">
-                <a16:creationId xmlns:a16="http://schemas.microsoft.com/office/drawing/2014/main" id="{CA1AFED7-144D-4716-A666-3F1D467474C5}"/>
-              </a:ext>
-            </a:extLst>
-          </p:cNvPr>
-          <p:cNvPicPr>
-            <a:picLocks noChangeAspect="1"/>
-          </p:cNvPicPr>
-          <p:nvPr/>
-        </p:nvPicPr>
-        <p:blipFill>
-          <a:blip r:embed="rId4"/>
-          <a:stretch>
-            <a:fillRect/>
-          </a:stretch>
-        </p:blipFill>
-        <p:spPr>
-          <a:xfrm>
-            <a:off x="6356614" y="2240085"/>
-            <a:ext cx="360000" cy="360000"/>
-          </a:xfrm>
-          <a:prstGeom prst="rect">
-            <a:avLst/>
-          </a:prstGeom>
-        </p:spPr>
-      </p:pic>
-      <p:pic>
-        <p:nvPicPr>
-          <p:cNvPr id="20" name="Picture 19">
-            <a:extLst>
-              <a:ext uri="{FF2B5EF4-FFF2-40B4-BE49-F238E27FC236}">
-                <a16:creationId xmlns:a16="http://schemas.microsoft.com/office/drawing/2014/main" id="{AA0E2C54-0C11-4333-A770-C0670562DEBA}"/>
+                <a16:creationId xmlns:a16="http://schemas.microsoft.com/office/drawing/2014/main" id="{84BA74F4-0D74-45BA-A90A-42E3EDADCF40}"/>
               </a:ext>
             </a:extLst>
           </p:cNvPr>
@@ -9253,8 +9223,8 @@
         </p:blipFill>
         <p:spPr>
           <a:xfrm>
-            <a:off x="3225024" y="2093883"/>
-            <a:ext cx="360000" cy="360000"/>
+            <a:off x="8240563" y="2459343"/>
+            <a:ext cx="180000" cy="180000"/>
           </a:xfrm>
           <a:prstGeom prst="rect">
             <a:avLst/>
@@ -9263,10 +9233,10 @@
       </p:pic>
       <p:pic>
         <p:nvPicPr>
-          <p:cNvPr id="21" name="Picture 20">
+          <p:cNvPr id="23" name="Picture 22">
             <a:extLst>
               <a:ext uri="{FF2B5EF4-FFF2-40B4-BE49-F238E27FC236}">
-                <a16:creationId xmlns:a16="http://schemas.microsoft.com/office/drawing/2014/main" id="{1811E613-8530-420F-AC86-24046088E5C5}"/>
+                <a16:creationId xmlns:a16="http://schemas.microsoft.com/office/drawing/2014/main" id="{DFCC2D02-37B7-4317-9652-2E33349F0EA2}"/>
               </a:ext>
             </a:extLst>
           </p:cNvPr>
@@ -9283,8 +9253,8 @@
         </p:blipFill>
         <p:spPr>
           <a:xfrm>
-            <a:off x="8479542" y="2459343"/>
-            <a:ext cx="187500" cy="180000"/>
+            <a:off x="8728781" y="2459343"/>
+            <a:ext cx="183675" cy="180000"/>
           </a:xfrm>
           <a:prstGeom prst="rect">
             <a:avLst/>
@@ -9293,10 +9263,10 @@
       </p:pic>
       <p:pic>
         <p:nvPicPr>
-          <p:cNvPr id="22" name="Picture 21">
+          <p:cNvPr id="24" name="Picture 23">
             <a:extLst>
               <a:ext uri="{FF2B5EF4-FFF2-40B4-BE49-F238E27FC236}">
-                <a16:creationId xmlns:a16="http://schemas.microsoft.com/office/drawing/2014/main" id="{84BA74F4-0D74-45BA-A90A-42E3EDADCF40}"/>
+                <a16:creationId xmlns:a16="http://schemas.microsoft.com/office/drawing/2014/main" id="{3DD966B6-977A-45FD-AB4B-594F7E30AC19}"/>
               </a:ext>
             </a:extLst>
           </p:cNvPr>
@@ -9313,7 +9283,7 @@
         </p:blipFill>
         <p:spPr>
           <a:xfrm>
-            <a:off x="8240563" y="2459343"/>
+            <a:off x="8001584" y="2459343"/>
             <a:ext cx="180000" cy="180000"/>
           </a:xfrm>
           <a:prstGeom prst="rect">
@@ -9323,10 +9293,128 @@
       </p:pic>
       <p:pic>
         <p:nvPicPr>
-          <p:cNvPr id="23" name="Picture 22">
+          <p:cNvPr id="25" name="Picture 24">
             <a:extLst>
               <a:ext uri="{FF2B5EF4-FFF2-40B4-BE49-F238E27FC236}">
-                <a16:creationId xmlns:a16="http://schemas.microsoft.com/office/drawing/2014/main" id="{DFCC2D02-37B7-4317-9652-2E33349F0EA2}"/>
+                <a16:creationId xmlns:a16="http://schemas.microsoft.com/office/drawing/2014/main" id="{9907FF13-CDAA-438B-9B04-492B7C6A7566}"/>
+              </a:ext>
+            </a:extLst>
+          </p:cNvPr>
+          <p:cNvPicPr>
+            <a:picLocks noChangeAspect="1"/>
+          </p:cNvPicPr>
+          <p:nvPr/>
+        </p:nvPicPr>
+        <p:blipFill>
+          <a:blip r:embed="rId2"/>
+          <a:stretch>
+            <a:fillRect/>
+          </a:stretch>
+        </p:blipFill>
+        <p:spPr>
+          <a:xfrm>
+            <a:off x="9966267" y="2427396"/>
+            <a:ext cx="360000" cy="360000"/>
+          </a:xfrm>
+          <a:prstGeom prst="rect">
+            <a:avLst/>
+          </a:prstGeom>
+        </p:spPr>
+      </p:pic>
+      <p:sp>
+        <p:nvSpPr>
+          <p:cNvPr id="28" name="TextBox 27">
+            <a:extLst>
+              <a:ext uri="{FF2B5EF4-FFF2-40B4-BE49-F238E27FC236}">
+                <a16:creationId xmlns:a16="http://schemas.microsoft.com/office/drawing/2014/main" id="{2AD51AFF-5859-41FC-9904-AEF2A2C173D0}"/>
+              </a:ext>
+            </a:extLst>
+          </p:cNvPr>
+          <p:cNvSpPr txBox="1"/>
+          <p:nvPr/>
+        </p:nvSpPr>
+        <p:spPr>
+          <a:xfrm>
+            <a:off x="3634289" y="1768896"/>
+            <a:ext cx="2103075" cy="276999"/>
+          </a:xfrm>
+          <a:prstGeom prst="rect">
+            <a:avLst/>
+          </a:prstGeom>
+          <a:noFill/>
+        </p:spPr>
+        <p:txBody>
+          <a:bodyPr wrap="square" rtlCol="0">
+            <a:spAutoFit/>
+          </a:bodyPr>
+          <a:lstStyle/>
+          <a:p>
+            <a:r>
+              <a:rPr lang="en-IE" sz="1200" dirty="0">
+                <a:solidFill>
+                  <a:schemeClr val="tx1">
+                    <a:lumMod val="65000"/>
+                    <a:lumOff val="35000"/>
+                  </a:schemeClr>
+                </a:solidFill>
+                <a:latin typeface="Segoe UI" panose="020B0502040204020203" pitchFamily="34" charset="0"/>
+                <a:cs typeface="Segoe UI" panose="020B0502040204020203" pitchFamily="34" charset="0"/>
+              </a:rPr>
+              <a:t>For every attachment</a:t>
+            </a:r>
+          </a:p>
+        </p:txBody>
+      </p:sp>
+      <p:sp>
+        <p:nvSpPr>
+          <p:cNvPr id="29" name="TextBox 28">
+            <a:extLst>
+              <a:ext uri="{FF2B5EF4-FFF2-40B4-BE49-F238E27FC236}">
+                <a16:creationId xmlns:a16="http://schemas.microsoft.com/office/drawing/2014/main" id="{550C0DD8-CA96-4E50-A6EE-177D75EEB050}"/>
+              </a:ext>
+            </a:extLst>
+          </p:cNvPr>
+          <p:cNvSpPr txBox="1"/>
+          <p:nvPr/>
+        </p:nvSpPr>
+        <p:spPr>
+          <a:xfrm>
+            <a:off x="6788185" y="1455579"/>
+            <a:ext cx="2238369" cy="276999"/>
+          </a:xfrm>
+          <a:prstGeom prst="rect">
+            <a:avLst/>
+          </a:prstGeom>
+          <a:noFill/>
+        </p:spPr>
+        <p:txBody>
+          <a:bodyPr wrap="square" rtlCol="0">
+            <a:spAutoFit/>
+          </a:bodyPr>
+          <a:lstStyle/>
+          <a:p>
+            <a:r>
+              <a:rPr lang="en-IE" sz="1200" dirty="0">
+                <a:solidFill>
+                  <a:schemeClr val="tx1">
+                    <a:lumMod val="65000"/>
+                    <a:lumOff val="35000"/>
+                  </a:schemeClr>
+                </a:solidFill>
+                <a:latin typeface="Segoe UI" panose="020B0502040204020203" pitchFamily="34" charset="0"/>
+                <a:cs typeface="Segoe UI" panose="020B0502040204020203" pitchFamily="34" charset="0"/>
+              </a:rPr>
+              <a:t>Face API – Facial Attributes</a:t>
+            </a:r>
+          </a:p>
+        </p:txBody>
+      </p:sp>
+      <p:pic>
+        <p:nvPicPr>
+          <p:cNvPr id="30" name="Picture 29">
+            <a:extLst>
+              <a:ext uri="{FF2B5EF4-FFF2-40B4-BE49-F238E27FC236}">
+                <a16:creationId xmlns:a16="http://schemas.microsoft.com/office/drawing/2014/main" id="{FC74C6BC-FEB6-4122-A1B6-F7736E394EA0}"/>
               </a:ext>
             </a:extLst>
           </p:cNvPr>
@@ -9343,8 +9431,8 @@
         </p:blipFill>
         <p:spPr>
           <a:xfrm>
-            <a:off x="8728781" y="2459343"/>
-            <a:ext cx="183675" cy="180000"/>
+            <a:off x="6356614" y="1434173"/>
+            <a:ext cx="374694" cy="360000"/>
           </a:xfrm>
           <a:prstGeom prst="rect">
             <a:avLst/>
@@ -9353,10 +9441,255 @@
       </p:pic>
       <p:pic>
         <p:nvPicPr>
-          <p:cNvPr id="24" name="Picture 23">
+          <p:cNvPr id="31" name="Picture 30">
             <a:extLst>
               <a:ext uri="{FF2B5EF4-FFF2-40B4-BE49-F238E27FC236}">
-                <a16:creationId xmlns:a16="http://schemas.microsoft.com/office/drawing/2014/main" id="{3DD966B6-977A-45FD-AB4B-594F7E30AC19}"/>
+                <a16:creationId xmlns:a16="http://schemas.microsoft.com/office/drawing/2014/main" id="{D3D0BA25-4179-4418-8CB3-55344F4BD7DB}"/>
+              </a:ext>
+            </a:extLst>
+          </p:cNvPr>
+          <p:cNvPicPr>
+            <a:picLocks noChangeAspect="1"/>
+          </p:cNvPicPr>
+          <p:nvPr/>
+        </p:nvPicPr>
+        <p:blipFill>
+          <a:blip r:embed="rId8"/>
+          <a:stretch>
+            <a:fillRect/>
+          </a:stretch>
+        </p:blipFill>
+        <p:spPr>
+          <a:xfrm>
+            <a:off x="6356614" y="1837129"/>
+            <a:ext cx="374694" cy="360000"/>
+          </a:xfrm>
+          <a:prstGeom prst="rect">
+            <a:avLst/>
+          </a:prstGeom>
+        </p:spPr>
+      </p:pic>
+      <p:sp>
+        <p:nvSpPr>
+          <p:cNvPr id="32" name="Rectangle 31">
+            <a:extLst>
+              <a:ext uri="{FF2B5EF4-FFF2-40B4-BE49-F238E27FC236}">
+                <a16:creationId xmlns:a16="http://schemas.microsoft.com/office/drawing/2014/main" id="{E10B27CE-9535-4C68-8F53-4A7E0D2C1EB8}"/>
+              </a:ext>
+            </a:extLst>
+          </p:cNvPr>
+          <p:cNvSpPr/>
+          <p:nvPr/>
+        </p:nvSpPr>
+        <p:spPr>
+          <a:xfrm>
+            <a:off x="3634289" y="2155235"/>
+            <a:ext cx="2110612" cy="276999"/>
+          </a:xfrm>
+          <a:prstGeom prst="rect">
+            <a:avLst/>
+          </a:prstGeom>
+        </p:spPr>
+        <p:txBody>
+          <a:bodyPr wrap="square">
+            <a:spAutoFit/>
+          </a:bodyPr>
+          <a:lstStyle/>
+          <a:p>
+            <a:r>
+              <a:rPr lang="en-IE" sz="1200" dirty="0">
+                <a:solidFill>
+                  <a:schemeClr val="tx1">
+                    <a:lumMod val="65000"/>
+                    <a:lumOff val="35000"/>
+                  </a:schemeClr>
+                </a:solidFill>
+                <a:latin typeface="Segoe UI" panose="020B0502040204020203" pitchFamily="34" charset="0"/>
+                <a:cs typeface="Segoe UI" panose="020B0502040204020203" pitchFamily="34" charset="0"/>
+              </a:rPr>
+              <a:t>Store it in Azure Blob</a:t>
+            </a:r>
+          </a:p>
+        </p:txBody>
+      </p:sp>
+      <p:sp>
+        <p:nvSpPr>
+          <p:cNvPr id="33" name="Rectangle 32">
+            <a:extLst>
+              <a:ext uri="{FF2B5EF4-FFF2-40B4-BE49-F238E27FC236}">
+                <a16:creationId xmlns:a16="http://schemas.microsoft.com/office/drawing/2014/main" id="{97521CC1-291A-418B-B43B-1A74A4A9C998}"/>
+              </a:ext>
+            </a:extLst>
+          </p:cNvPr>
+          <p:cNvSpPr/>
+          <p:nvPr/>
+        </p:nvSpPr>
+        <p:spPr>
+          <a:xfrm>
+            <a:off x="3634289" y="2520785"/>
+            <a:ext cx="2194076" cy="276999"/>
+          </a:xfrm>
+          <a:prstGeom prst="rect">
+            <a:avLst/>
+          </a:prstGeom>
+        </p:spPr>
+        <p:txBody>
+          <a:bodyPr wrap="square">
+            <a:spAutoFit/>
+          </a:bodyPr>
+          <a:lstStyle/>
+          <a:p>
+            <a:r>
+              <a:rPr lang="en-IE" sz="1200" dirty="0">
+                <a:solidFill>
+                  <a:schemeClr val="tx1">
+                    <a:lumMod val="65000"/>
+                    <a:lumOff val="35000"/>
+                  </a:schemeClr>
+                </a:solidFill>
+                <a:latin typeface="Segoe UI" panose="020B0502040204020203" pitchFamily="34" charset="0"/>
+                <a:cs typeface="Segoe UI" panose="020B0502040204020203" pitchFamily="34" charset="0"/>
+              </a:rPr>
+              <a:t>Write to streaming dataset</a:t>
+            </a:r>
+          </a:p>
+        </p:txBody>
+      </p:sp>
+      <p:sp>
+        <p:nvSpPr>
+          <p:cNvPr id="34" name="Rectangle 33">
+            <a:extLst>
+              <a:ext uri="{FF2B5EF4-FFF2-40B4-BE49-F238E27FC236}">
+                <a16:creationId xmlns:a16="http://schemas.microsoft.com/office/drawing/2014/main" id="{7E39360A-1FAF-4B3B-B087-C7FC8D31E094}"/>
+              </a:ext>
+            </a:extLst>
+          </p:cNvPr>
+          <p:cNvSpPr/>
+          <p:nvPr/>
+        </p:nvSpPr>
+        <p:spPr>
+          <a:xfrm>
+            <a:off x="3634289" y="2880858"/>
+            <a:ext cx="1044645" cy="276999"/>
+          </a:xfrm>
+          <a:prstGeom prst="rect">
+            <a:avLst/>
+          </a:prstGeom>
+        </p:spPr>
+        <p:txBody>
+          <a:bodyPr wrap="none">
+            <a:spAutoFit/>
+          </a:bodyPr>
+          <a:lstStyle/>
+          <a:p>
+            <a:r>
+              <a:rPr lang="en-IE" sz="1200" dirty="0">
+                <a:solidFill>
+                  <a:schemeClr val="tx1">
+                    <a:lumMod val="65000"/>
+                    <a:lumOff val="35000"/>
+                  </a:schemeClr>
+                </a:solidFill>
+                <a:latin typeface="Segoe UI" panose="020B0502040204020203" pitchFamily="34" charset="0"/>
+                <a:cs typeface="Segoe UI" panose="020B0502040204020203" pitchFamily="34" charset="0"/>
+              </a:rPr>
+              <a:t>Write to SQL</a:t>
+            </a:r>
+          </a:p>
+        </p:txBody>
+      </p:sp>
+      <p:sp>
+        <p:nvSpPr>
+          <p:cNvPr id="35" name="Rectangle 34">
+            <a:extLst>
+              <a:ext uri="{FF2B5EF4-FFF2-40B4-BE49-F238E27FC236}">
+                <a16:creationId xmlns:a16="http://schemas.microsoft.com/office/drawing/2014/main" id="{82BA3F06-C4D5-4651-9266-1666927015D2}"/>
+              </a:ext>
+            </a:extLst>
+          </p:cNvPr>
+          <p:cNvSpPr/>
+          <p:nvPr/>
+        </p:nvSpPr>
+        <p:spPr>
+          <a:xfrm>
+            <a:off x="6788185" y="1858324"/>
+            <a:ext cx="2238369" cy="276999"/>
+          </a:xfrm>
+          <a:prstGeom prst="rect">
+            <a:avLst/>
+          </a:prstGeom>
+        </p:spPr>
+        <p:txBody>
+          <a:bodyPr wrap="square">
+            <a:spAutoFit/>
+          </a:bodyPr>
+          <a:lstStyle/>
+          <a:p>
+            <a:r>
+              <a:rPr lang="en-IE" sz="1200" dirty="0">
+                <a:solidFill>
+                  <a:schemeClr val="tx1">
+                    <a:lumMod val="65000"/>
+                    <a:lumOff val="35000"/>
+                  </a:schemeClr>
+                </a:solidFill>
+                <a:latin typeface="Segoe UI" panose="020B0502040204020203" pitchFamily="34" charset="0"/>
+                <a:cs typeface="Segoe UI" panose="020B0502040204020203" pitchFamily="34" charset="0"/>
+              </a:rPr>
+              <a:t>Face API - Recognition</a:t>
+            </a:r>
+          </a:p>
+        </p:txBody>
+      </p:sp>
+      <p:sp>
+        <p:nvSpPr>
+          <p:cNvPr id="36" name="Rectangle 35">
+            <a:extLst>
+              <a:ext uri="{FF2B5EF4-FFF2-40B4-BE49-F238E27FC236}">
+                <a16:creationId xmlns:a16="http://schemas.microsoft.com/office/drawing/2014/main" id="{BB3CB3D9-4D23-42F0-9791-394A2B59D6DD}"/>
+              </a:ext>
+            </a:extLst>
+          </p:cNvPr>
+          <p:cNvSpPr/>
+          <p:nvPr/>
+        </p:nvSpPr>
+        <p:spPr>
+          <a:xfrm>
+            <a:off x="6788185" y="2256557"/>
+            <a:ext cx="1044645" cy="276999"/>
+          </a:xfrm>
+          <a:prstGeom prst="rect">
+            <a:avLst/>
+          </a:prstGeom>
+        </p:spPr>
+        <p:txBody>
+          <a:bodyPr wrap="none">
+            <a:spAutoFit/>
+          </a:bodyPr>
+          <a:lstStyle/>
+          <a:p>
+            <a:r>
+              <a:rPr lang="en-IE" sz="1200" dirty="0">
+                <a:solidFill>
+                  <a:schemeClr val="tx1">
+                    <a:lumMod val="65000"/>
+                    <a:lumOff val="35000"/>
+                  </a:schemeClr>
+                </a:solidFill>
+                <a:latin typeface="Segoe UI" panose="020B0502040204020203" pitchFamily="34" charset="0"/>
+                <a:cs typeface="Segoe UI" panose="020B0502040204020203" pitchFamily="34" charset="0"/>
+              </a:rPr>
+              <a:t>Write to SQL</a:t>
+            </a:r>
+          </a:p>
+        </p:txBody>
+      </p:sp>
+      <p:pic>
+        <p:nvPicPr>
+          <p:cNvPr id="37" name="Picture 36">
+            <a:extLst>
+              <a:ext uri="{FF2B5EF4-FFF2-40B4-BE49-F238E27FC236}">
+                <a16:creationId xmlns:a16="http://schemas.microsoft.com/office/drawing/2014/main" id="{FF4340EE-E259-4530-8377-C3B5A533CAB0}"/>
               </a:ext>
             </a:extLst>
           </p:cNvPr>
@@ -9373,50 +9706,20 @@
         </p:blipFill>
         <p:spPr>
           <a:xfrm>
-            <a:off x="8001584" y="2459343"/>
-            <a:ext cx="180000" cy="180000"/>
+            <a:off x="6350924" y="3094076"/>
+            <a:ext cx="360000" cy="360000"/>
           </a:xfrm>
           <a:prstGeom prst="rect">
             <a:avLst/>
           </a:prstGeom>
         </p:spPr>
       </p:pic>
-      <p:pic>
-        <p:nvPicPr>
-          <p:cNvPr id="25" name="Picture 24">
+      <p:sp>
+        <p:nvSpPr>
+          <p:cNvPr id="38" name="TextBox 37">
             <a:extLst>
               <a:ext uri="{FF2B5EF4-FFF2-40B4-BE49-F238E27FC236}">
-                <a16:creationId xmlns:a16="http://schemas.microsoft.com/office/drawing/2014/main" id="{9907FF13-CDAA-438B-9B04-492B7C6A7566}"/>
-              </a:ext>
-            </a:extLst>
-          </p:cNvPr>
-          <p:cNvPicPr>
-            <a:picLocks noChangeAspect="1"/>
-          </p:cNvPicPr>
-          <p:nvPr/>
-        </p:nvPicPr>
-        <p:blipFill>
-          <a:blip r:embed="rId2"/>
-          <a:stretch>
-            <a:fillRect/>
-          </a:stretch>
-        </p:blipFill>
-        <p:spPr>
-          <a:xfrm>
-            <a:off x="9966267" y="2427396"/>
-            <a:ext cx="360000" cy="360000"/>
-          </a:xfrm>
-          <a:prstGeom prst="rect">
-            <a:avLst/>
-          </a:prstGeom>
-        </p:spPr>
-      </p:pic>
-      <p:sp>
-        <p:nvSpPr>
-          <p:cNvPr id="28" name="TextBox 27">
-            <a:extLst>
-              <a:ext uri="{FF2B5EF4-FFF2-40B4-BE49-F238E27FC236}">
-                <a16:creationId xmlns:a16="http://schemas.microsoft.com/office/drawing/2014/main" id="{2AD51AFF-5859-41FC-9904-AEF2A2C173D0}"/>
+                <a16:creationId xmlns:a16="http://schemas.microsoft.com/office/drawing/2014/main" id="{AD25A02E-59B8-4972-A2D3-7B50ABE50DA2}"/>
               </a:ext>
             </a:extLst>
           </p:cNvPr>
@@ -9425,8 +9728,8 @@
         </p:nvSpPr>
         <p:spPr>
           <a:xfrm>
-            <a:off x="3634289" y="1768896"/>
-            <a:ext cx="2103075" cy="276999"/>
+            <a:off x="6782495" y="3110394"/>
+            <a:ext cx="2129961" cy="276999"/>
           </a:xfrm>
           <a:prstGeom prst="rect">
             <a:avLst/>
@@ -9450,121 +9753,17 @@
                 <a:latin typeface="Segoe UI" panose="020B0502040204020203" pitchFamily="34" charset="0"/>
                 <a:cs typeface="Segoe UI" panose="020B0502040204020203" pitchFamily="34" charset="0"/>
               </a:rPr>
-              <a:t>For every attachment</a:t>
-            </a:r>
-          </a:p>
-        </p:txBody>
-      </p:sp>
-      <p:sp>
-        <p:nvSpPr>
-          <p:cNvPr id="29" name="TextBox 28">
+              <a:t>Computer Vision</a:t>
+            </a:r>
+          </a:p>
+        </p:txBody>
+      </p:sp>
+      <p:sp>
+        <p:nvSpPr>
+          <p:cNvPr id="39" name="Rectangle 38">
             <a:extLst>
               <a:ext uri="{FF2B5EF4-FFF2-40B4-BE49-F238E27FC236}">
-                <a16:creationId xmlns:a16="http://schemas.microsoft.com/office/drawing/2014/main" id="{550C0DD8-CA96-4E50-A6EE-177D75EEB050}"/>
-              </a:ext>
-            </a:extLst>
-          </p:cNvPr>
-          <p:cNvSpPr txBox="1"/>
-          <p:nvPr/>
-        </p:nvSpPr>
-        <p:spPr>
-          <a:xfrm>
-            <a:off x="6788185" y="1455579"/>
-            <a:ext cx="2238369" cy="276999"/>
-          </a:xfrm>
-          <a:prstGeom prst="rect">
-            <a:avLst/>
-          </a:prstGeom>
-          <a:noFill/>
-        </p:spPr>
-        <p:txBody>
-          <a:bodyPr wrap="square" rtlCol="0">
-            <a:spAutoFit/>
-          </a:bodyPr>
-          <a:lstStyle/>
-          <a:p>
-            <a:r>
-              <a:rPr lang="en-IE" sz="1200" dirty="0">
-                <a:solidFill>
-                  <a:schemeClr val="tx1">
-                    <a:lumMod val="65000"/>
-                    <a:lumOff val="35000"/>
-                  </a:schemeClr>
-                </a:solidFill>
-                <a:latin typeface="Segoe UI" panose="020B0502040204020203" pitchFamily="34" charset="0"/>
-                <a:cs typeface="Segoe UI" panose="020B0502040204020203" pitchFamily="34" charset="0"/>
-              </a:rPr>
-              <a:t>Face API – Facial Attributes</a:t>
-            </a:r>
-          </a:p>
-        </p:txBody>
-      </p:sp>
-      <p:pic>
-        <p:nvPicPr>
-          <p:cNvPr id="30" name="Picture 29">
-            <a:extLst>
-              <a:ext uri="{FF2B5EF4-FFF2-40B4-BE49-F238E27FC236}">
-                <a16:creationId xmlns:a16="http://schemas.microsoft.com/office/drawing/2014/main" id="{FC74C6BC-FEB6-4122-A1B6-F7736E394EA0}"/>
-              </a:ext>
-            </a:extLst>
-          </p:cNvPr>
-          <p:cNvPicPr>
-            <a:picLocks noChangeAspect="1"/>
-          </p:cNvPicPr>
-          <p:nvPr/>
-        </p:nvPicPr>
-        <p:blipFill>
-          <a:blip r:embed="rId10"/>
-          <a:stretch>
-            <a:fillRect/>
-          </a:stretch>
-        </p:blipFill>
-        <p:spPr>
-          <a:xfrm>
-            <a:off x="6356614" y="1434173"/>
-            <a:ext cx="374694" cy="360000"/>
-          </a:xfrm>
-          <a:prstGeom prst="rect">
-            <a:avLst/>
-          </a:prstGeom>
-        </p:spPr>
-      </p:pic>
-      <p:pic>
-        <p:nvPicPr>
-          <p:cNvPr id="31" name="Picture 30">
-            <a:extLst>
-              <a:ext uri="{FF2B5EF4-FFF2-40B4-BE49-F238E27FC236}">
-                <a16:creationId xmlns:a16="http://schemas.microsoft.com/office/drawing/2014/main" id="{D3D0BA25-4179-4418-8CB3-55344F4BD7DB}"/>
-              </a:ext>
-            </a:extLst>
-          </p:cNvPr>
-          <p:cNvPicPr>
-            <a:picLocks noChangeAspect="1"/>
-          </p:cNvPicPr>
-          <p:nvPr/>
-        </p:nvPicPr>
-        <p:blipFill>
-          <a:blip r:embed="rId10"/>
-          <a:stretch>
-            <a:fillRect/>
-          </a:stretch>
-        </p:blipFill>
-        <p:spPr>
-          <a:xfrm>
-            <a:off x="6356614" y="1837129"/>
-            <a:ext cx="374694" cy="360000"/>
-          </a:xfrm>
-          <a:prstGeom prst="rect">
-            <a:avLst/>
-          </a:prstGeom>
-        </p:spPr>
-      </p:pic>
-      <p:sp>
-        <p:nvSpPr>
-          <p:cNvPr id="32" name="Rectangle 31">
-            <a:extLst>
-              <a:ext uri="{FF2B5EF4-FFF2-40B4-BE49-F238E27FC236}">
-                <a16:creationId xmlns:a16="http://schemas.microsoft.com/office/drawing/2014/main" id="{E10B27CE-9535-4C68-8F53-4A7E0D2C1EB8}"/>
+                <a16:creationId xmlns:a16="http://schemas.microsoft.com/office/drawing/2014/main" id="{903EAAE5-E362-4EDC-8FA6-B402020ED175}"/>
               </a:ext>
             </a:extLst>
           </p:cNvPr>
@@ -9573,8 +9772,8 @@
         </p:nvSpPr>
         <p:spPr>
           <a:xfrm>
-            <a:off x="3634289" y="2155235"/>
-            <a:ext cx="2110612" cy="276999"/>
+            <a:off x="6782495" y="3513139"/>
+            <a:ext cx="2017556" cy="276999"/>
           </a:xfrm>
           <a:prstGeom prst="rect">
             <a:avLst/>
@@ -9582,92 +9781,6 @@
         </p:spPr>
         <p:txBody>
           <a:bodyPr wrap="square">
-            <a:spAutoFit/>
-          </a:bodyPr>
-          <a:lstStyle/>
-          <a:p>
-            <a:r>
-              <a:rPr lang="en-IE" sz="1200" dirty="0">
-                <a:solidFill>
-                  <a:schemeClr val="tx1">
-                    <a:lumMod val="65000"/>
-                    <a:lumOff val="35000"/>
-                  </a:schemeClr>
-                </a:solidFill>
-                <a:latin typeface="Segoe UI" panose="020B0502040204020203" pitchFamily="34" charset="0"/>
-                <a:cs typeface="Segoe UI" panose="020B0502040204020203" pitchFamily="34" charset="0"/>
-              </a:rPr>
-              <a:t>Store it in Azure Blob</a:t>
-            </a:r>
-          </a:p>
-        </p:txBody>
-      </p:sp>
-      <p:sp>
-        <p:nvSpPr>
-          <p:cNvPr id="33" name="Rectangle 32">
-            <a:extLst>
-              <a:ext uri="{FF2B5EF4-FFF2-40B4-BE49-F238E27FC236}">
-                <a16:creationId xmlns:a16="http://schemas.microsoft.com/office/drawing/2014/main" id="{97521CC1-291A-418B-B43B-1A74A4A9C998}"/>
-              </a:ext>
-            </a:extLst>
-          </p:cNvPr>
-          <p:cNvSpPr/>
-          <p:nvPr/>
-        </p:nvSpPr>
-        <p:spPr>
-          <a:xfrm>
-            <a:off x="3634289" y="2520785"/>
-            <a:ext cx="2194076" cy="276999"/>
-          </a:xfrm>
-          <a:prstGeom prst="rect">
-            <a:avLst/>
-          </a:prstGeom>
-        </p:spPr>
-        <p:txBody>
-          <a:bodyPr wrap="square">
-            <a:spAutoFit/>
-          </a:bodyPr>
-          <a:lstStyle/>
-          <a:p>
-            <a:r>
-              <a:rPr lang="en-IE" sz="1200" dirty="0">
-                <a:solidFill>
-                  <a:schemeClr val="tx1">
-                    <a:lumMod val="65000"/>
-                    <a:lumOff val="35000"/>
-                  </a:schemeClr>
-                </a:solidFill>
-                <a:latin typeface="Segoe UI" panose="020B0502040204020203" pitchFamily="34" charset="0"/>
-                <a:cs typeface="Segoe UI" panose="020B0502040204020203" pitchFamily="34" charset="0"/>
-              </a:rPr>
-              <a:t>Write to streaming dataset</a:t>
-            </a:r>
-          </a:p>
-        </p:txBody>
-      </p:sp>
-      <p:sp>
-        <p:nvSpPr>
-          <p:cNvPr id="34" name="Rectangle 33">
-            <a:extLst>
-              <a:ext uri="{FF2B5EF4-FFF2-40B4-BE49-F238E27FC236}">
-                <a16:creationId xmlns:a16="http://schemas.microsoft.com/office/drawing/2014/main" id="{7E39360A-1FAF-4B3B-B087-C7FC8D31E094}"/>
-              </a:ext>
-            </a:extLst>
-          </p:cNvPr>
-          <p:cNvSpPr/>
-          <p:nvPr/>
-        </p:nvSpPr>
-        <p:spPr>
-          <a:xfrm>
-            <a:off x="3634289" y="2880858"/>
-            <a:ext cx="1044645" cy="276999"/>
-          </a:xfrm>
-          <a:prstGeom prst="rect">
-            <a:avLst/>
-          </a:prstGeom>
-        </p:spPr>
-        <p:txBody>
-          <a:bodyPr wrap="none">
             <a:spAutoFit/>
           </a:bodyPr>
           <a:lstStyle/>
@@ -9688,239 +9801,6 @@
           </a:p>
         </p:txBody>
       </p:sp>
-      <p:sp>
-        <p:nvSpPr>
-          <p:cNvPr id="35" name="Rectangle 34">
-            <a:extLst>
-              <a:ext uri="{FF2B5EF4-FFF2-40B4-BE49-F238E27FC236}">
-                <a16:creationId xmlns:a16="http://schemas.microsoft.com/office/drawing/2014/main" id="{82BA3F06-C4D5-4651-9266-1666927015D2}"/>
-              </a:ext>
-            </a:extLst>
-          </p:cNvPr>
-          <p:cNvSpPr/>
-          <p:nvPr/>
-        </p:nvSpPr>
-        <p:spPr>
-          <a:xfrm>
-            <a:off x="6788185" y="1858324"/>
-            <a:ext cx="2238369" cy="276999"/>
-          </a:xfrm>
-          <a:prstGeom prst="rect">
-            <a:avLst/>
-          </a:prstGeom>
-        </p:spPr>
-        <p:txBody>
-          <a:bodyPr wrap="square">
-            <a:spAutoFit/>
-          </a:bodyPr>
-          <a:lstStyle/>
-          <a:p>
-            <a:r>
-              <a:rPr lang="en-IE" sz="1200" dirty="0">
-                <a:solidFill>
-                  <a:schemeClr val="tx1">
-                    <a:lumMod val="65000"/>
-                    <a:lumOff val="35000"/>
-                  </a:schemeClr>
-                </a:solidFill>
-                <a:latin typeface="Segoe UI" panose="020B0502040204020203" pitchFamily="34" charset="0"/>
-                <a:cs typeface="Segoe UI" panose="020B0502040204020203" pitchFamily="34" charset="0"/>
-              </a:rPr>
-              <a:t>Face API - Recognition</a:t>
-            </a:r>
-          </a:p>
-        </p:txBody>
-      </p:sp>
-      <p:sp>
-        <p:nvSpPr>
-          <p:cNvPr id="36" name="Rectangle 35">
-            <a:extLst>
-              <a:ext uri="{FF2B5EF4-FFF2-40B4-BE49-F238E27FC236}">
-                <a16:creationId xmlns:a16="http://schemas.microsoft.com/office/drawing/2014/main" id="{BB3CB3D9-4D23-42F0-9791-394A2B59D6DD}"/>
-              </a:ext>
-            </a:extLst>
-          </p:cNvPr>
-          <p:cNvSpPr/>
-          <p:nvPr/>
-        </p:nvSpPr>
-        <p:spPr>
-          <a:xfrm>
-            <a:off x="6788185" y="2256557"/>
-            <a:ext cx="1044645" cy="276999"/>
-          </a:xfrm>
-          <a:prstGeom prst="rect">
-            <a:avLst/>
-          </a:prstGeom>
-        </p:spPr>
-        <p:txBody>
-          <a:bodyPr wrap="none">
-            <a:spAutoFit/>
-          </a:bodyPr>
-          <a:lstStyle/>
-          <a:p>
-            <a:r>
-              <a:rPr lang="en-IE" sz="1200" dirty="0">
-                <a:solidFill>
-                  <a:schemeClr val="tx1">
-                    <a:lumMod val="65000"/>
-                    <a:lumOff val="35000"/>
-                  </a:schemeClr>
-                </a:solidFill>
-                <a:latin typeface="Segoe UI" panose="020B0502040204020203" pitchFamily="34" charset="0"/>
-                <a:cs typeface="Segoe UI" panose="020B0502040204020203" pitchFamily="34" charset="0"/>
-              </a:rPr>
-              <a:t>Write to SQL</a:t>
-            </a:r>
-          </a:p>
-        </p:txBody>
-      </p:sp>
-      <p:pic>
-        <p:nvPicPr>
-          <p:cNvPr id="37" name="Picture 36">
-            <a:extLst>
-              <a:ext uri="{FF2B5EF4-FFF2-40B4-BE49-F238E27FC236}">
-                <a16:creationId xmlns:a16="http://schemas.microsoft.com/office/drawing/2014/main" id="{FF4340EE-E259-4530-8377-C3B5A533CAB0}"/>
-              </a:ext>
-            </a:extLst>
-          </p:cNvPr>
-          <p:cNvPicPr>
-            <a:picLocks noChangeAspect="1"/>
-          </p:cNvPicPr>
-          <p:nvPr/>
-        </p:nvPicPr>
-        <p:blipFill>
-          <a:blip r:embed="rId11"/>
-          <a:stretch>
-            <a:fillRect/>
-          </a:stretch>
-        </p:blipFill>
-        <p:spPr>
-          <a:xfrm>
-            <a:off x="6350924" y="3094076"/>
-            <a:ext cx="360000" cy="360000"/>
-          </a:xfrm>
-          <a:prstGeom prst="rect">
-            <a:avLst/>
-          </a:prstGeom>
-        </p:spPr>
-      </p:pic>
-      <p:sp>
-        <p:nvSpPr>
-          <p:cNvPr id="38" name="TextBox 37">
-            <a:extLst>
-              <a:ext uri="{FF2B5EF4-FFF2-40B4-BE49-F238E27FC236}">
-                <a16:creationId xmlns:a16="http://schemas.microsoft.com/office/drawing/2014/main" id="{AD25A02E-59B8-4972-A2D3-7B50ABE50DA2}"/>
-              </a:ext>
-            </a:extLst>
-          </p:cNvPr>
-          <p:cNvSpPr txBox="1"/>
-          <p:nvPr/>
-        </p:nvSpPr>
-        <p:spPr>
-          <a:xfrm>
-            <a:off x="6782495" y="3110394"/>
-            <a:ext cx="2129961" cy="276999"/>
-          </a:xfrm>
-          <a:prstGeom prst="rect">
-            <a:avLst/>
-          </a:prstGeom>
-          <a:noFill/>
-        </p:spPr>
-        <p:txBody>
-          <a:bodyPr wrap="square" rtlCol="0">
-            <a:spAutoFit/>
-          </a:bodyPr>
-          <a:lstStyle/>
-          <a:p>
-            <a:r>
-              <a:rPr lang="en-IE" sz="1200" dirty="0">
-                <a:solidFill>
-                  <a:schemeClr val="tx1">
-                    <a:lumMod val="65000"/>
-                    <a:lumOff val="35000"/>
-                  </a:schemeClr>
-                </a:solidFill>
-                <a:latin typeface="Segoe UI" panose="020B0502040204020203" pitchFamily="34" charset="0"/>
-                <a:cs typeface="Segoe UI" panose="020B0502040204020203" pitchFamily="34" charset="0"/>
-              </a:rPr>
-              <a:t>Computer Vision</a:t>
-            </a:r>
-          </a:p>
-        </p:txBody>
-      </p:sp>
-      <p:sp>
-        <p:nvSpPr>
-          <p:cNvPr id="39" name="Rectangle 38">
-            <a:extLst>
-              <a:ext uri="{FF2B5EF4-FFF2-40B4-BE49-F238E27FC236}">
-                <a16:creationId xmlns:a16="http://schemas.microsoft.com/office/drawing/2014/main" id="{903EAAE5-E362-4EDC-8FA6-B402020ED175}"/>
-              </a:ext>
-            </a:extLst>
-          </p:cNvPr>
-          <p:cNvSpPr/>
-          <p:nvPr/>
-        </p:nvSpPr>
-        <p:spPr>
-          <a:xfrm>
-            <a:off x="6782495" y="3513139"/>
-            <a:ext cx="2017556" cy="276999"/>
-          </a:xfrm>
-          <a:prstGeom prst="rect">
-            <a:avLst/>
-          </a:prstGeom>
-        </p:spPr>
-        <p:txBody>
-          <a:bodyPr wrap="square">
-            <a:spAutoFit/>
-          </a:bodyPr>
-          <a:lstStyle/>
-          <a:p>
-            <a:r>
-              <a:rPr lang="en-IE" sz="1200" dirty="0">
-                <a:solidFill>
-                  <a:schemeClr val="tx1">
-                    <a:lumMod val="65000"/>
-                    <a:lumOff val="35000"/>
-                  </a:schemeClr>
-                </a:solidFill>
-                <a:latin typeface="Segoe UI" panose="020B0502040204020203" pitchFamily="34" charset="0"/>
-                <a:cs typeface="Segoe UI" panose="020B0502040204020203" pitchFamily="34" charset="0"/>
-              </a:rPr>
-              <a:t>Write to SQL</a:t>
-            </a:r>
-          </a:p>
-        </p:txBody>
-      </p:sp>
-      <p:pic>
-        <p:nvPicPr>
-          <p:cNvPr id="40" name="Picture 39">
-            <a:extLst>
-              <a:ext uri="{FF2B5EF4-FFF2-40B4-BE49-F238E27FC236}">
-                <a16:creationId xmlns:a16="http://schemas.microsoft.com/office/drawing/2014/main" id="{6019F957-AA2B-4190-91A9-0D0EFD9D76B3}"/>
-              </a:ext>
-            </a:extLst>
-          </p:cNvPr>
-          <p:cNvPicPr>
-            <a:picLocks noChangeAspect="1"/>
-          </p:cNvPicPr>
-          <p:nvPr/>
-        </p:nvPicPr>
-        <p:blipFill>
-          <a:blip r:embed="rId4"/>
-          <a:stretch>
-            <a:fillRect/>
-          </a:stretch>
-        </p:blipFill>
-        <p:spPr>
-          <a:xfrm>
-            <a:off x="6350924" y="3513139"/>
-            <a:ext cx="360000" cy="360000"/>
-          </a:xfrm>
-          <a:prstGeom prst="rect">
-            <a:avLst/>
-          </a:prstGeom>
-        </p:spPr>
-      </p:pic>
       <p:sp>
         <p:nvSpPr>
           <p:cNvPr id="41" name="TextBox 40">
@@ -10461,15 +10341,15 @@
           </p:cNvPr>
           <p:cNvCxnSpPr>
             <a:cxnSpLocks/>
-            <a:stCxn id="18" idx="2"/>
+            <a:stCxn id="26" idx="2"/>
             <a:endCxn id="5" idx="0"/>
           </p:cNvCxnSpPr>
           <p:nvPr/>
         </p:nvCxnSpPr>
         <p:spPr>
           <a:xfrm rot="16200000" flipH="1">
-            <a:off x="4392629" y="2190063"/>
-            <a:ext cx="1684616" cy="3675154"/>
+            <a:off x="4390530" y="2187964"/>
+            <a:ext cx="1680204" cy="3683763"/>
           </a:xfrm>
           <a:prstGeom prst="curvedConnector3">
             <a:avLst>
@@ -10512,15 +10392,15 @@
           </p:cNvPr>
           <p:cNvCxnSpPr>
             <a:cxnSpLocks/>
-            <a:stCxn id="40" idx="2"/>
+            <a:stCxn id="63" idx="2"/>
             <a:endCxn id="5" idx="0"/>
           </p:cNvCxnSpPr>
           <p:nvPr/>
         </p:nvCxnSpPr>
         <p:spPr>
           <a:xfrm rot="16200000" flipH="1">
-            <a:off x="6303315" y="4100748"/>
-            <a:ext cx="996809" cy="541590"/>
+            <a:off x="6292044" y="4089478"/>
+            <a:ext cx="1021552" cy="539388"/>
           </a:xfrm>
           <a:prstGeom prst="curvedConnector3">
             <a:avLst>
@@ -10671,7 +10551,7 @@
           <p:nvPr/>
         </p:nvPicPr>
         <p:blipFill>
-          <a:blip r:embed="rId12"/>
+          <a:blip r:embed="rId10"/>
           <a:stretch>
             <a:fillRect/>
           </a:stretch>
@@ -10708,7 +10588,7 @@
           <p:nvPr/>
         </p:nvPicPr>
         <p:blipFill>
-          <a:blip r:embed="rId12"/>
+          <a:blip r:embed="rId10"/>
           <a:stretch>
             <a:fillRect/>
           </a:stretch>
@@ -10745,13 +10625,13 @@
           <p:nvPr/>
         </p:nvPicPr>
         <p:blipFill>
-          <a:blip r:embed="rId13">
+          <a:blip r:embed="rId11">
             <a:extLst>
               <a:ext uri="{28A0092B-C50C-407E-A947-70E740481C1C}">
                 <a14:useLocalDpi xmlns:a14="http://schemas.microsoft.com/office/drawing/2010/main" val="0"/>
               </a:ext>
               <a:ext uri="{96DAC541-7B7A-43D3-8B79-37D633B846F1}">
-                <asvg:svgBlip xmlns:asvg="http://schemas.microsoft.com/office/drawing/2016/SVG/main" r:embed="rId14"/>
+                <asvg:svgBlip xmlns:asvg="http://schemas.microsoft.com/office/drawing/2016/SVG/main" r:embed="rId12"/>
               </a:ext>
             </a:extLst>
           </a:blip>
@@ -10784,13 +10664,13 @@
           <p:nvPr/>
         </p:nvPicPr>
         <p:blipFill>
-          <a:blip r:embed="rId13" cstate="print">
+          <a:blip r:embed="rId11" cstate="print">
             <a:extLst>
               <a:ext uri="{28A0092B-C50C-407E-A947-70E740481C1C}">
                 <a14:useLocalDpi xmlns:a14="http://schemas.microsoft.com/office/drawing/2010/main" val="0"/>
               </a:ext>
               <a:ext uri="{96DAC541-7B7A-43D3-8B79-37D633B846F1}">
-                <asvg:svgBlip xmlns:asvg="http://schemas.microsoft.com/office/drawing/2016/SVG/main" r:embed="rId14"/>
+                <asvg:svgBlip xmlns:asvg="http://schemas.microsoft.com/office/drawing/2016/SVG/main" r:embed="rId12"/>
               </a:ext>
             </a:extLst>
           </a:blip>
@@ -10823,7 +10703,7 @@
           <p:nvPr/>
         </p:nvPicPr>
         <p:blipFill>
-          <a:blip r:embed="rId15"/>
+          <a:blip r:embed="rId13"/>
           <a:stretch>
             <a:fillRect/>
           </a:stretch>
@@ -10853,13 +10733,13 @@
           <p:nvPr/>
         </p:nvPicPr>
         <p:blipFill>
-          <a:blip r:embed="rId16" cstate="print">
+          <a:blip r:embed="rId14" cstate="print">
             <a:extLst>
               <a:ext uri="{28A0092B-C50C-407E-A947-70E740481C1C}">
                 <a14:useLocalDpi xmlns:a14="http://schemas.microsoft.com/office/drawing/2010/main" val="0"/>
               </a:ext>
               <a:ext uri="{96DAC541-7B7A-43D3-8B79-37D633B846F1}">
-                <asvg:svgBlip xmlns:asvg="http://schemas.microsoft.com/office/drawing/2016/SVG/main" r:embed="rId17"/>
+                <asvg:svgBlip xmlns:asvg="http://schemas.microsoft.com/office/drawing/2016/SVG/main" r:embed="rId15"/>
               </a:ext>
             </a:extLst>
           </a:blip>
@@ -10921,6 +10801,162 @@
           </a:p>
         </p:txBody>
       </p:sp>
+      <p:pic>
+        <p:nvPicPr>
+          <p:cNvPr id="9" name="Graphic 8">
+            <a:extLst>
+              <a:ext uri="{FF2B5EF4-FFF2-40B4-BE49-F238E27FC236}">
+                <a16:creationId xmlns:a16="http://schemas.microsoft.com/office/drawing/2014/main" id="{115FF5D9-F835-412B-87EE-979C7341EECE}"/>
+              </a:ext>
+            </a:extLst>
+          </p:cNvPr>
+          <p:cNvPicPr>
+            <a:picLocks noChangeAspect="1"/>
+          </p:cNvPicPr>
+          <p:nvPr/>
+        </p:nvPicPr>
+        <p:blipFill>
+          <a:blip r:embed="rId16">
+            <a:extLst>
+              <a:ext uri="{28A0092B-C50C-407E-A947-70E740481C1C}">
+                <a14:useLocalDpi xmlns:a14="http://schemas.microsoft.com/office/drawing/2010/main" val="0"/>
+              </a:ext>
+              <a:ext uri="{96DAC541-7B7A-43D3-8B79-37D633B846F1}">
+                <asvg:svgBlip xmlns:asvg="http://schemas.microsoft.com/office/drawing/2016/SVG/main" r:embed="rId17"/>
+              </a:ext>
+            </a:extLst>
+          </a:blip>
+          <a:stretch>
+            <a:fillRect/>
+          </a:stretch>
+        </p:blipFill>
+        <p:spPr>
+          <a:xfrm>
+            <a:off x="3236046" y="2093546"/>
+            <a:ext cx="324000" cy="324000"/>
+          </a:xfrm>
+          <a:prstGeom prst="rect">
+            <a:avLst/>
+          </a:prstGeom>
+        </p:spPr>
+      </p:pic>
+      <p:pic>
+        <p:nvPicPr>
+          <p:cNvPr id="26" name="Graphic 25">
+            <a:extLst>
+              <a:ext uri="{FF2B5EF4-FFF2-40B4-BE49-F238E27FC236}">
+                <a16:creationId xmlns:a16="http://schemas.microsoft.com/office/drawing/2014/main" id="{C0E0FA42-6AC5-470C-A1A6-0BDE896F3F65}"/>
+              </a:ext>
+            </a:extLst>
+          </p:cNvPr>
+          <p:cNvPicPr>
+            <a:picLocks noChangeAspect="1"/>
+          </p:cNvPicPr>
+          <p:nvPr/>
+        </p:nvPicPr>
+        <p:blipFill>
+          <a:blip r:embed="rId18">
+            <a:extLst>
+              <a:ext uri="{28A0092B-C50C-407E-A947-70E740481C1C}">
+                <a14:useLocalDpi xmlns:a14="http://schemas.microsoft.com/office/drawing/2010/main" val="0"/>
+              </a:ext>
+              <a:ext uri="{96DAC541-7B7A-43D3-8B79-37D633B846F1}">
+                <asvg:svgBlip xmlns:asvg="http://schemas.microsoft.com/office/drawing/2016/SVG/main" r:embed="rId19"/>
+              </a:ext>
+            </a:extLst>
+          </a:blip>
+          <a:stretch>
+            <a:fillRect/>
+          </a:stretch>
+        </p:blipFill>
+        <p:spPr>
+          <a:xfrm>
+            <a:off x="3226751" y="2865744"/>
+            <a:ext cx="324000" cy="324000"/>
+          </a:xfrm>
+          <a:prstGeom prst="rect">
+            <a:avLst/>
+          </a:prstGeom>
+        </p:spPr>
+      </p:pic>
+      <p:pic>
+        <p:nvPicPr>
+          <p:cNvPr id="61" name="Graphic 60">
+            <a:extLst>
+              <a:ext uri="{FF2B5EF4-FFF2-40B4-BE49-F238E27FC236}">
+                <a16:creationId xmlns:a16="http://schemas.microsoft.com/office/drawing/2014/main" id="{34C9A095-F8C2-4534-A789-9522069BA09B}"/>
+              </a:ext>
+            </a:extLst>
+          </p:cNvPr>
+          <p:cNvPicPr>
+            <a:picLocks noChangeAspect="1"/>
+          </p:cNvPicPr>
+          <p:nvPr/>
+        </p:nvPicPr>
+        <p:blipFill>
+          <a:blip r:embed="rId18">
+            <a:extLst>
+              <a:ext uri="{28A0092B-C50C-407E-A947-70E740481C1C}">
+                <a14:useLocalDpi xmlns:a14="http://schemas.microsoft.com/office/drawing/2010/main" val="0"/>
+              </a:ext>
+              <a:ext uri="{96DAC541-7B7A-43D3-8B79-37D633B846F1}">
+                <asvg:svgBlip xmlns:asvg="http://schemas.microsoft.com/office/drawing/2016/SVG/main" r:embed="rId19"/>
+              </a:ext>
+            </a:extLst>
+          </a:blip>
+          <a:stretch>
+            <a:fillRect/>
+          </a:stretch>
+        </p:blipFill>
+        <p:spPr>
+          <a:xfrm>
+            <a:off x="6375175" y="2242370"/>
+            <a:ext cx="324000" cy="324000"/>
+          </a:xfrm>
+          <a:prstGeom prst="rect">
+            <a:avLst/>
+          </a:prstGeom>
+        </p:spPr>
+      </p:pic>
+      <p:pic>
+        <p:nvPicPr>
+          <p:cNvPr id="63" name="Graphic 62">
+            <a:extLst>
+              <a:ext uri="{FF2B5EF4-FFF2-40B4-BE49-F238E27FC236}">
+                <a16:creationId xmlns:a16="http://schemas.microsoft.com/office/drawing/2014/main" id="{01EA63B9-C65B-48C7-8F29-3C720299FB28}"/>
+              </a:ext>
+            </a:extLst>
+          </p:cNvPr>
+          <p:cNvPicPr>
+            <a:picLocks noChangeAspect="1"/>
+          </p:cNvPicPr>
+          <p:nvPr/>
+        </p:nvPicPr>
+        <p:blipFill>
+          <a:blip r:embed="rId18">
+            <a:extLst>
+              <a:ext uri="{28A0092B-C50C-407E-A947-70E740481C1C}">
+                <a14:useLocalDpi xmlns:a14="http://schemas.microsoft.com/office/drawing/2010/main" val="0"/>
+              </a:ext>
+              <a:ext uri="{96DAC541-7B7A-43D3-8B79-37D633B846F1}">
+                <asvg:svgBlip xmlns:asvg="http://schemas.microsoft.com/office/drawing/2016/SVG/main" r:embed="rId19"/>
+              </a:ext>
+            </a:extLst>
+          </a:blip>
+          <a:stretch>
+            <a:fillRect/>
+          </a:stretch>
+        </p:blipFill>
+        <p:spPr>
+          <a:xfrm>
+            <a:off x="6371126" y="3524396"/>
+            <a:ext cx="324000" cy="324000"/>
+          </a:xfrm>
+          <a:prstGeom prst="rect">
+            <a:avLst/>
+          </a:prstGeom>
+        </p:spPr>
+      </p:pic>
     </p:spTree>
     <p:extLst>
       <p:ext uri="{BB962C8B-B14F-4D97-AF65-F5344CB8AC3E}">
@@ -11951,21 +11987,6 @@
 </file>
 
 <file path=customXml/item1.xml><?xml version="1.0" encoding="utf-8"?>
-<p:properties xmlns:p="http://schemas.microsoft.com/office/2006/metadata/properties" xmlns:xsi="http://www.w3.org/2001/XMLSchema-instance" xmlns:pc="http://schemas.microsoft.com/office/infopath/2007/PartnerControls">
-  <documentManagement/>
-</p:properties>
-</file>
-
-<file path=customXml/item2.xml><?xml version="1.0" encoding="utf-8"?>
-<?mso-contentType ?>
-<FormTemplates xmlns="http://schemas.microsoft.com/sharepoint/v3/contenttype/forms">
-  <Display>DocumentLibraryForm</Display>
-  <Edit>DocumentLibraryForm</Edit>
-  <New>DocumentLibraryForm</New>
-</FormTemplates>
-</file>
-
-<file path=customXml/item3.xml><?xml version="1.0" encoding="utf-8"?>
 <ct:contentTypeSchema xmlns:ct="http://schemas.microsoft.com/office/2006/metadata/contentType" xmlns:ma="http://schemas.microsoft.com/office/2006/metadata/properties/metaAttributes" ct:_="" ma:_="" ma:contentTypeName="Document" ma:contentTypeID="0x010100C06DE69A4F4BF842879CBB58309FEB35" ma:contentTypeVersion="10" ma:contentTypeDescription="Create a new document." ma:contentTypeScope="" ma:versionID="2186611467dfd53204e79c9641488a9c">
   <xsd:schema xmlns:xsd="http://www.w3.org/2001/XMLSchema" xmlns:xs="http://www.w3.org/2001/XMLSchema" xmlns:p="http://schemas.microsoft.com/office/2006/metadata/properties" xmlns:ns2="12d2731f-cf8f-4a67-b1ff-7d98a1aee283" xmlns:ns3="c353b6c8-18ed-4b56-a5c5-6495e55a9c15" targetNamespace="http://schemas.microsoft.com/office/2006/metadata/properties" ma:root="true" ma:fieldsID="d8b4bb9d5ba4a874382a27d5d1ce83b4" ns2:_="" ns3:_="">
     <xsd:import namespace="12d2731f-cf8f-4a67-b1ff-7d98a1aee283"/>
@@ -12168,32 +12189,22 @@
 </ct:contentTypeSchema>
 </file>
 
-<file path=customXml/itemProps1.xml><?xml version="1.0" encoding="utf-8"?>
-<ds:datastoreItem xmlns:ds="http://schemas.openxmlformats.org/officeDocument/2006/customXml" ds:itemID="{A2AA3CB1-2443-4FA1-815D-951C2BDC7424}">
-  <ds:schemaRefs>
-    <ds:schemaRef ds:uri="http://schemas.microsoft.com/office/2006/documentManagement/types"/>
-    <ds:schemaRef ds:uri="http://purl.org/dc/elements/1.1/"/>
-    <ds:schemaRef ds:uri="http://www.w3.org/XML/1998/namespace"/>
-    <ds:schemaRef ds:uri="12d2731f-cf8f-4a67-b1ff-7d98a1aee283"/>
-    <ds:schemaRef ds:uri="http://schemas.microsoft.com/office/infopath/2007/PartnerControls"/>
-    <ds:schemaRef ds:uri="http://purl.org/dc/terms/"/>
-    <ds:schemaRef ds:uri="http://purl.org/dc/dcmitype/"/>
-    <ds:schemaRef ds:uri="c353b6c8-18ed-4b56-a5c5-6495e55a9c15"/>
-    <ds:schemaRef ds:uri="http://schemas.openxmlformats.org/package/2006/metadata/core-properties"/>
-    <ds:schemaRef ds:uri="http://schemas.microsoft.com/office/2006/metadata/properties"/>
-  </ds:schemaRefs>
-</ds:datastoreItem>
+<file path=customXml/item2.xml><?xml version="1.0" encoding="utf-8"?>
+<?mso-contentType ?>
+<FormTemplates xmlns="http://schemas.microsoft.com/sharepoint/v3/contenttype/forms">
+  <Display>DocumentLibraryForm</Display>
+  <Edit>DocumentLibraryForm</Edit>
+  <New>DocumentLibraryForm</New>
+</FormTemplates>
 </file>
 
-<file path=customXml/itemProps2.xml><?xml version="1.0" encoding="utf-8"?>
-<ds:datastoreItem xmlns:ds="http://schemas.openxmlformats.org/officeDocument/2006/customXml" ds:itemID="{10C75660-6496-4BAB-8878-FA53D17BE5D9}">
-  <ds:schemaRefs>
-    <ds:schemaRef ds:uri="http://schemas.microsoft.com/sharepoint/v3/contenttype/forms"/>
-  </ds:schemaRefs>
-</ds:datastoreItem>
+<file path=customXml/item3.xml><?xml version="1.0" encoding="utf-8"?>
+<p:properties xmlns:p="http://schemas.microsoft.com/office/2006/metadata/properties" xmlns:xsi="http://www.w3.org/2001/XMLSchema-instance" xmlns:pc="http://schemas.microsoft.com/office/infopath/2007/PartnerControls">
+  <documentManagement/>
+</p:properties>
 </file>
 
-<file path=customXml/itemProps3.xml><?xml version="1.0" encoding="utf-8"?>
+<file path=customXml/itemProps1.xml><?xml version="1.0" encoding="utf-8"?>
 <ds:datastoreItem xmlns:ds="http://schemas.openxmlformats.org/officeDocument/2006/customXml" ds:itemID="{A531BB72-B9A7-4BD7-BFB1-AC10A5517624}">
   <ds:schemaRefs>
     <ds:schemaRef ds:uri="http://schemas.microsoft.com/office/2006/metadata/contentType"/>
@@ -12210,4 +12221,29 @@
     <ds:schemaRef ds:uri="http://schemas.microsoft.com/internal/obd"/>
   </ds:schemaRefs>
 </ds:datastoreItem>
+</file>
+
+<file path=customXml/itemProps2.xml><?xml version="1.0" encoding="utf-8"?>
+<ds:datastoreItem xmlns:ds="http://schemas.openxmlformats.org/officeDocument/2006/customXml" ds:itemID="{10C75660-6496-4BAB-8878-FA53D17BE5D9}">
+  <ds:schemaRefs>
+    <ds:schemaRef ds:uri="http://schemas.microsoft.com/sharepoint/v3/contenttype/forms"/>
+  </ds:schemaRefs>
+</ds:datastoreItem>
+</file>
+
+<file path=customXml/itemProps3.xml><?xml version="1.0" encoding="utf-8"?>
+<ds:datastoreItem xmlns:ds="http://schemas.openxmlformats.org/officeDocument/2006/customXml" ds:itemID="{A2AA3CB1-2443-4FA1-815D-951C2BDC7424}">
+  <ds:schemaRefs>
+    <ds:schemaRef ds:uri="http://schemas.microsoft.com/office/2006/documentManagement/types"/>
+    <ds:schemaRef ds:uri="http://purl.org/dc/elements/1.1/"/>
+    <ds:schemaRef ds:uri="http://www.w3.org/XML/1998/namespace"/>
+    <ds:schemaRef ds:uri="12d2731f-cf8f-4a67-b1ff-7d98a1aee283"/>
+    <ds:schemaRef ds:uri="http://schemas.microsoft.com/office/infopath/2007/PartnerControls"/>
+    <ds:schemaRef ds:uri="http://purl.org/dc/terms/"/>
+    <ds:schemaRef ds:uri="http://purl.org/dc/dcmitype/"/>
+    <ds:schemaRef ds:uri="c353b6c8-18ed-4b56-a5c5-6495e55a9c15"/>
+    <ds:schemaRef ds:uri="http://schemas.openxmlformats.org/package/2006/metadata/core-properties"/>
+    <ds:schemaRef ds:uri="http://schemas.microsoft.com/office/2006/metadata/properties"/>
+  </ds:schemaRefs>
+</ds:datastoreItem>
 </file>
</xml_diff>